<commit_message>
Added placeholder files for Example3. Implemented a way to rerun a single model without rebuilding for example 3
fix #5
</commit_message>
<xml_diff>
--- a/Docs/Generating code for the AR Drone 2.pptx
+++ b/Docs/Generating code for the AR Drone 2.pptx
@@ -5,16 +5,19 @@
     <p:sldMasterId id="2147483648" r:id="rId1"/>
   </p:sldMasterIdLst>
   <p:notesMasterIdLst>
-    <p:notesMasterId r:id="rId6"/>
+    <p:notesMasterId r:id="rId9"/>
   </p:notesMasterIdLst>
   <p:handoutMasterIdLst>
-    <p:handoutMasterId r:id="rId7"/>
+    <p:handoutMasterId r:id="rId10"/>
   </p:handoutMasterIdLst>
   <p:sldIdLst>
     <p:sldId id="256" r:id="rId2"/>
     <p:sldId id="276" r:id="rId3"/>
     <p:sldId id="278" r:id="rId4"/>
     <p:sldId id="279" r:id="rId5"/>
+    <p:sldId id="280" r:id="rId6"/>
+    <p:sldId id="281" r:id="rId7"/>
+    <p:sldId id="282" r:id="rId8"/>
   </p:sldIdLst>
   <p:sldSz cx="12192000" cy="6858000"/>
   <p:notesSz cx="6858000" cy="9144000"/>
@@ -122,6 +125,9 @@
             <p14:sldId id="276"/>
             <p14:sldId id="278"/>
             <p14:sldId id="279"/>
+            <p14:sldId id="280"/>
+            <p14:sldId id="281"/>
+            <p14:sldId id="282"/>
           </p14:sldIdLst>
         </p14:section>
       </p14:sectionLst>
@@ -1850,8 +1856,8 @@
   </dgm:ptLst>
   <dgm:cxnLst>
     <dgm:cxn modelId="{EE089CAC-D045-468E-842C-0A2FB129512F}" srcId="{FF89F812-E80F-445D-B036-292CDE9EF7D1}" destId="{ED5BFC03-3720-4543-9A41-D1660FD86A39}" srcOrd="0" destOrd="0" parTransId="{D339D639-52CB-4DDB-B5C9-85193C07E061}" sibTransId="{93E8477D-872B-46F4-BB34-BBFFC2D96F07}"/>
+    <dgm:cxn modelId="{58631243-889C-4806-AEED-0BC826B73D8D}" type="presOf" srcId="{D1D155C9-9BF1-4A4B-9B0C-F4A78B8F0C26}" destId="{C4A9AAD0-3114-4E1A-B79D-30A1D8873DEF}" srcOrd="0" destOrd="0" presId="urn:microsoft.com/office/officeart/2005/8/layout/lProcess3"/>
     <dgm:cxn modelId="{6BF4494E-65C0-424C-B019-12D6E13851A1}" srcId="{ED5BFC03-3720-4543-9A41-D1660FD86A39}" destId="{D1D155C9-9BF1-4A4B-9B0C-F4A78B8F0C26}" srcOrd="1" destOrd="0" parTransId="{1647755C-F7A0-41B3-9DBE-BA61829D4FCE}" sibTransId="{163F9425-F1DE-4813-AEAE-6A6EAE66C214}"/>
-    <dgm:cxn modelId="{58631243-889C-4806-AEED-0BC826B73D8D}" type="presOf" srcId="{D1D155C9-9BF1-4A4B-9B0C-F4A78B8F0C26}" destId="{C4A9AAD0-3114-4E1A-B79D-30A1D8873DEF}" srcOrd="0" destOrd="0" presId="urn:microsoft.com/office/officeart/2005/8/layout/lProcess3"/>
     <dgm:cxn modelId="{4D596C97-4E66-4EDD-8CC3-49BE1456E2F3}" type="presOf" srcId="{19646798-32E2-4F57-98A8-027B5C38944E}" destId="{69C763B0-79B3-4C8F-AE21-8321731021B5}" srcOrd="0" destOrd="0" presId="urn:microsoft.com/office/officeart/2005/8/layout/lProcess3"/>
     <dgm:cxn modelId="{CE5CF2AB-16BF-415D-9F39-20D36BD03F4C}" srcId="{ED5BFC03-3720-4543-9A41-D1660FD86A39}" destId="{19646798-32E2-4F57-98A8-027B5C38944E}" srcOrd="0" destOrd="0" parTransId="{00E8E2F0-3D84-43BD-AAFF-AC85FA143DDD}" sibTransId="{D9A6488D-7819-4BC5-A1E1-90BC6DA13937}"/>
     <dgm:cxn modelId="{EF97AB40-01D6-41BE-8AB9-E45A494BFD15}" type="presOf" srcId="{FF89F812-E80F-445D-B036-292CDE9EF7D1}" destId="{B0637D3C-C25E-42EA-BC1D-69D2477ADA46}" srcOrd="0" destOrd="0" presId="urn:microsoft.com/office/officeart/2005/8/layout/lProcess3"/>
@@ -2007,11 +2013,11 @@
     </dgm:pt>
   </dgm:ptLst>
   <dgm:cxnLst>
+    <dgm:cxn modelId="{EE089CAC-D045-468E-842C-0A2FB129512F}" srcId="{FF89F812-E80F-445D-B036-292CDE9EF7D1}" destId="{ED5BFC03-3720-4543-9A41-D1660FD86A39}" srcOrd="0" destOrd="0" parTransId="{D339D639-52CB-4DDB-B5C9-85193C07E061}" sibTransId="{93E8477D-872B-46F4-BB34-BBFFC2D96F07}"/>
+    <dgm:cxn modelId="{8AEC80B0-0D95-4740-99DB-1BFC7FF0E5A3}" type="presOf" srcId="{19646798-32E2-4F57-98A8-027B5C38944E}" destId="{69C763B0-79B3-4C8F-AE21-8321731021B5}" srcOrd="0" destOrd="0" presId="urn:microsoft.com/office/officeart/2005/8/layout/lProcess3"/>
+    <dgm:cxn modelId="{CE5CF2AB-16BF-415D-9F39-20D36BD03F4C}" srcId="{ED5BFC03-3720-4543-9A41-D1660FD86A39}" destId="{19646798-32E2-4F57-98A8-027B5C38944E}" srcOrd="0" destOrd="0" parTransId="{00E8E2F0-3D84-43BD-AAFF-AC85FA143DDD}" sibTransId="{D9A6488D-7819-4BC5-A1E1-90BC6DA13937}"/>
     <dgm:cxn modelId="{CB527779-5411-4EFD-90FD-7265C3EA62AD}" type="presOf" srcId="{ED5BFC03-3720-4543-9A41-D1660FD86A39}" destId="{B223AF9C-DA87-4D10-89AC-1A59FB340D77}" srcOrd="0" destOrd="0" presId="urn:microsoft.com/office/officeart/2005/8/layout/lProcess3"/>
-    <dgm:cxn modelId="{8AEC80B0-0D95-4740-99DB-1BFC7FF0E5A3}" type="presOf" srcId="{19646798-32E2-4F57-98A8-027B5C38944E}" destId="{69C763B0-79B3-4C8F-AE21-8321731021B5}" srcOrd="0" destOrd="0" presId="urn:microsoft.com/office/officeart/2005/8/layout/lProcess3"/>
-    <dgm:cxn modelId="{EE089CAC-D045-468E-842C-0A2FB129512F}" srcId="{FF89F812-E80F-445D-B036-292CDE9EF7D1}" destId="{ED5BFC03-3720-4543-9A41-D1660FD86A39}" srcOrd="0" destOrd="0" parTransId="{D339D639-52CB-4DDB-B5C9-85193C07E061}" sibTransId="{93E8477D-872B-46F4-BB34-BBFFC2D96F07}"/>
     <dgm:cxn modelId="{471A5D08-5DC0-48E8-8CAE-067641070503}" type="presOf" srcId="{FF89F812-E80F-445D-B036-292CDE9EF7D1}" destId="{B0637D3C-C25E-42EA-BC1D-69D2477ADA46}" srcOrd="0" destOrd="0" presId="urn:microsoft.com/office/officeart/2005/8/layout/lProcess3"/>
-    <dgm:cxn modelId="{CE5CF2AB-16BF-415D-9F39-20D36BD03F4C}" srcId="{ED5BFC03-3720-4543-9A41-D1660FD86A39}" destId="{19646798-32E2-4F57-98A8-027B5C38944E}" srcOrd="0" destOrd="0" parTransId="{00E8E2F0-3D84-43BD-AAFF-AC85FA143DDD}" sibTransId="{D9A6488D-7819-4BC5-A1E1-90BC6DA13937}"/>
     <dgm:cxn modelId="{FBF6DF09-B30D-4023-82AE-991C397BF8C4}" type="presParOf" srcId="{B0637D3C-C25E-42EA-BC1D-69D2477ADA46}" destId="{C582B725-E35A-44A2-B639-43A028A9C803}" srcOrd="0" destOrd="0" presId="urn:microsoft.com/office/officeart/2005/8/layout/lProcess3"/>
     <dgm:cxn modelId="{2962187F-8A0F-4F73-974C-1E2DE324A178}" type="presParOf" srcId="{C582B725-E35A-44A2-B639-43A028A9C803}" destId="{B223AF9C-DA87-4D10-89AC-1A59FB340D77}" srcOrd="0" destOrd="0" presId="urn:microsoft.com/office/officeart/2005/8/layout/lProcess3"/>
     <dgm:cxn modelId="{F7071DD0-8224-4132-9BCE-328D50BF8018}" type="presParOf" srcId="{C582B725-E35A-44A2-B639-43A028A9C803}" destId="{A13DEB8E-AA4B-4148-9232-43CE00DE9558}" srcOrd="1" destOrd="0" presId="urn:microsoft.com/office/officeart/2005/8/layout/lProcess3"/>
@@ -5146,7 +5152,7 @@
             <a:fld id="{5F993C83-2184-4286-ABE1-941A40B40C8F}" type="datetimeFigureOut">
               <a:rPr lang="en-US" smtClean="0"/>
               <a:pPr/>
-              <a:t>4/29/2016</a:t>
+              <a:t>5/11/2016</a:t>
             </a:fld>
             <a:endParaRPr lang="en-US"/>
           </a:p>
@@ -5313,7 +5319,7 @@
             <a:fld id="{6053241F-7ED4-45AC-844C-15DB0D5F9CCD}" type="datetimeFigureOut">
               <a:rPr lang="en-US" smtClean="0"/>
               <a:pPr/>
-              <a:t>4/29/2016</a:t>
+              <a:t>5/11/2016</a:t>
             </a:fld>
             <a:endParaRPr lang="en-US"/>
           </a:p>
@@ -10296,6 +10302,486 @@
 </p:sld>
 </file>
 
+<file path=ppt/slides/slide5.xml><?xml version="1.0" encoding="utf-8"?>
+<p:sld xmlns:a="http://schemas.openxmlformats.org/drawingml/2006/main" xmlns:r="http://schemas.openxmlformats.org/officeDocument/2006/relationships" xmlns:p="http://schemas.openxmlformats.org/presentationml/2006/main">
+  <p:cSld>
+    <p:spTree>
+      <p:nvGrpSpPr>
+        <p:cNvPr id="1" name=""/>
+        <p:cNvGrpSpPr/>
+        <p:nvPr/>
+      </p:nvGrpSpPr>
+      <p:grpSpPr>
+        <a:xfrm>
+          <a:off x="0" y="0"/>
+          <a:ext cx="0" cy="0"/>
+          <a:chOff x="0" y="0"/>
+          <a:chExt cx="0" cy="0"/>
+        </a:xfrm>
+      </p:grpSpPr>
+      <p:sp>
+        <p:nvSpPr>
+          <p:cNvPr id="2" name="Title 1"/>
+          <p:cNvSpPr>
+            <a:spLocks noGrp="1"/>
+          </p:cNvSpPr>
+          <p:nvPr>
+            <p:ph type="title"/>
+          </p:nvPr>
+        </p:nvSpPr>
+        <p:spPr/>
+        <p:txBody>
+          <a:bodyPr/>
+          <a:lstStyle/>
+          <a:p>
+            <a:r>
+              <a:rPr lang="nl-NL" dirty="0" smtClean="0"/>
+              <a:t>AR_Drone_2_thead.xml</a:t>
+            </a:r>
+            <a:endParaRPr lang="nl-NL" dirty="0"/>
+          </a:p>
+        </p:txBody>
+      </p:sp>
+      <p:sp>
+        <p:nvSpPr>
+          <p:cNvPr id="3" name="Content Placeholder 2"/>
+          <p:cNvSpPr>
+            <a:spLocks noGrp="1"/>
+          </p:cNvSpPr>
+          <p:nvPr>
+            <p:ph idx="1"/>
+          </p:nvPr>
+        </p:nvSpPr>
+        <p:spPr/>
+        <p:txBody>
+          <a:bodyPr/>
+          <a:lstStyle/>
+          <a:p>
+            <a:pPr lvl="1"/>
+            <a:r>
+              <a:rPr lang="nl-NL" dirty="0" smtClean="0"/>
+              <a:t>Purpose:</a:t>
+            </a:r>
+          </a:p>
+          <a:p>
+            <a:pPr lvl="2"/>
+            <a:r>
+              <a:rPr lang="nl-NL" dirty="0" smtClean="0"/>
+              <a:t>Create custom user options required for the “Build, load and run” process</a:t>
+            </a:r>
+          </a:p>
+          <a:p>
+            <a:pPr lvl="2"/>
+            <a:r>
+              <a:rPr lang="nl-NL" smtClean="0"/>
+              <a:t>Specify target specific flags and external mode files</a:t>
+            </a:r>
+            <a:endParaRPr lang="nl-NL" dirty="0" smtClean="0"/>
+          </a:p>
+          <a:p>
+            <a:pPr lvl="1"/>
+            <a:r>
+              <a:rPr lang="nl-NL" dirty="0" smtClean="0"/>
+              <a:t>Invoked by:</a:t>
+            </a:r>
+          </a:p>
+          <a:p>
+            <a:pPr lvl="2"/>
+            <a:r>
+              <a:rPr lang="nl-NL" dirty="0" smtClean="0">
+                <a:solidFill>
+                  <a:srgbClr val="FF0000"/>
+                </a:solidFill>
+              </a:rPr>
+              <a:t>??????????</a:t>
+            </a:r>
+          </a:p>
+          <a:p>
+            <a:pPr lvl="1"/>
+            <a:r>
+              <a:rPr lang="nl-NL" dirty="0" smtClean="0"/>
+              <a:t>Appears to the user as:</a:t>
+            </a:r>
+          </a:p>
+          <a:p>
+            <a:pPr lvl="2"/>
+            <a:r>
+              <a:rPr lang="nl-NL" dirty="0" smtClean="0"/>
+              <a:t>Configuration parameters &gt; Hardware Implementation &gt; Hardware Board</a:t>
+            </a:r>
+          </a:p>
+          <a:p>
+            <a:pPr lvl="2"/>
+            <a:r>
+              <a:rPr lang="nl-NL" dirty="0"/>
+              <a:t>Configuration </a:t>
+            </a:r>
+            <a:r>
+              <a:rPr lang="nl-NL" dirty="0" smtClean="0"/>
+              <a:t>parameters &gt; Code Generation &gt; Toolchain</a:t>
+            </a:r>
+          </a:p>
+          <a:p>
+            <a:pPr lvl="1"/>
+            <a:r>
+              <a:rPr lang="nl-NL" dirty="0" smtClean="0"/>
+              <a:t>Contains:</a:t>
+            </a:r>
+          </a:p>
+          <a:p>
+            <a:pPr lvl="2"/>
+            <a:r>
+              <a:rPr lang="nl-NL" dirty="0" smtClean="0"/>
+              <a:t>User description for the Hardware Board UI and Toolchain name</a:t>
+            </a:r>
+          </a:p>
+          <a:p>
+            <a:pPr lvl="2"/>
+            <a:r>
+              <a:rPr lang="nl-NL" dirty="0" smtClean="0"/>
+              <a:t>Commands passed to the ssh_download.bat script </a:t>
+            </a:r>
+          </a:p>
+          <a:p>
+            <a:pPr lvl="2"/>
+            <a:r>
+              <a:rPr lang="nl-NL" dirty="0" smtClean="0"/>
+              <a:t>Location of the MATLAB linux codertarget XML file</a:t>
+            </a:r>
+          </a:p>
+          <a:p>
+            <a:pPr lvl="1"/>
+            <a:r>
+              <a:rPr lang="nl-NL" dirty="0" smtClean="0"/>
+              <a:t>Custom file pointers:</a:t>
+            </a:r>
+            <a:endParaRPr lang="nl-NL" u="sng" dirty="0" smtClean="0"/>
+          </a:p>
+          <a:p>
+            <a:pPr lvl="2"/>
+            <a:r>
+              <a:rPr lang="nl-NL" dirty="0" smtClean="0"/>
+              <a:t>arm_cortex_a8_ParameterInfo.xml</a:t>
+            </a:r>
+          </a:p>
+          <a:p>
+            <a:pPr lvl="2"/>
+            <a:r>
+              <a:rPr lang="nl-NL" dirty="0" smtClean="0"/>
+              <a:t>arm_cortex_a8_AttributeInfo.xml</a:t>
+            </a:r>
+            <a:endParaRPr lang="nl-NL" dirty="0"/>
+          </a:p>
+        </p:txBody>
+      </p:sp>
+    </p:spTree>
+    <p:extLst>
+      <p:ext uri="{BB962C8B-B14F-4D97-AF65-F5344CB8AC3E}">
+        <p14:creationId xmlns:p14="http://schemas.microsoft.com/office/powerpoint/2010/main" val="3092856080"/>
+      </p:ext>
+    </p:extLst>
+  </p:cSld>
+  <p:clrMapOvr>
+    <a:masterClrMapping/>
+  </p:clrMapOvr>
+</p:sld>
+</file>
+
+<file path=ppt/slides/slide6.xml><?xml version="1.0" encoding="utf-8"?>
+<p:sld xmlns:a="http://schemas.openxmlformats.org/drawingml/2006/main" xmlns:r="http://schemas.openxmlformats.org/officeDocument/2006/relationships" xmlns:p="http://schemas.openxmlformats.org/presentationml/2006/main">
+  <p:cSld>
+    <p:spTree>
+      <p:nvGrpSpPr>
+        <p:cNvPr id="1" name=""/>
+        <p:cNvGrpSpPr/>
+        <p:nvPr/>
+      </p:nvGrpSpPr>
+      <p:grpSpPr>
+        <a:xfrm>
+          <a:off x="0" y="0"/>
+          <a:ext cx="0" cy="0"/>
+          <a:chOff x="0" y="0"/>
+          <a:chExt cx="0" cy="0"/>
+        </a:xfrm>
+      </p:grpSpPr>
+      <p:sp>
+        <p:nvSpPr>
+          <p:cNvPr id="2" name="Title 1"/>
+          <p:cNvSpPr>
+            <a:spLocks noGrp="1"/>
+          </p:cNvSpPr>
+          <p:nvPr>
+            <p:ph type="title"/>
+          </p:nvPr>
+        </p:nvSpPr>
+        <p:spPr/>
+        <p:txBody>
+          <a:bodyPr/>
+          <a:lstStyle/>
+          <a:p>
+            <a:r>
+              <a:rPr lang="nl-NL" dirty="0"/>
+              <a:t>arm_cortex_a8_ParameterInfo.xml</a:t>
+            </a:r>
+            <a:br>
+              <a:rPr lang="nl-NL" dirty="0"/>
+            </a:br>
+            <a:endParaRPr lang="nl-NL" dirty="0"/>
+          </a:p>
+        </p:txBody>
+      </p:sp>
+      <p:sp>
+        <p:nvSpPr>
+          <p:cNvPr id="3" name="Content Placeholder 2"/>
+          <p:cNvSpPr>
+            <a:spLocks noGrp="1"/>
+          </p:cNvSpPr>
+          <p:nvPr>
+            <p:ph idx="1"/>
+          </p:nvPr>
+        </p:nvSpPr>
+        <p:spPr/>
+        <p:txBody>
+          <a:bodyPr/>
+          <a:lstStyle/>
+          <a:p>
+            <a:pPr lvl="1"/>
+            <a:r>
+              <a:rPr lang="nl-NL" dirty="0"/>
+              <a:t>Purpose</a:t>
+            </a:r>
+            <a:r>
+              <a:rPr lang="nl-NL" dirty="0" smtClean="0"/>
+              <a:t>:</a:t>
+            </a:r>
+          </a:p>
+          <a:p>
+            <a:pPr lvl="2"/>
+            <a:r>
+              <a:rPr lang="nl-NL" dirty="0" smtClean="0"/>
+              <a:t>Provide custom UI options to the user in the configuration parameters</a:t>
+            </a:r>
+          </a:p>
+          <a:p>
+            <a:pPr lvl="1"/>
+            <a:r>
+              <a:rPr lang="nl-NL" dirty="0" smtClean="0"/>
+              <a:t>Invoked </a:t>
+            </a:r>
+            <a:r>
+              <a:rPr lang="nl-NL" dirty="0"/>
+              <a:t>by:</a:t>
+            </a:r>
+          </a:p>
+          <a:p>
+            <a:pPr lvl="2"/>
+            <a:r>
+              <a:rPr lang="nl-NL" dirty="0" smtClean="0"/>
+              <a:t>AR_Drone_2_thread.xml</a:t>
+            </a:r>
+            <a:endParaRPr lang="nl-NL" dirty="0"/>
+          </a:p>
+          <a:p>
+            <a:pPr lvl="1"/>
+            <a:r>
+              <a:rPr lang="nl-NL" dirty="0"/>
+              <a:t>Appears to the user as</a:t>
+            </a:r>
+            <a:r>
+              <a:rPr lang="nl-NL" dirty="0" smtClean="0"/>
+              <a:t>:</a:t>
+            </a:r>
+          </a:p>
+          <a:p>
+            <a:pPr lvl="2"/>
+            <a:r>
+              <a:rPr lang="nl-NL" dirty="0"/>
+              <a:t>Configuration parameters &gt; Hardware Implementation &gt; </a:t>
+            </a:r>
+            <a:r>
+              <a:rPr lang="nl-NL" dirty="0" smtClean="0"/>
+              <a:t>Target Hardware Resources</a:t>
+            </a:r>
+            <a:endParaRPr lang="nl-NL" dirty="0"/>
+          </a:p>
+          <a:p>
+            <a:pPr lvl="1"/>
+            <a:r>
+              <a:rPr lang="nl-NL" dirty="0" smtClean="0"/>
+              <a:t>Contains:</a:t>
+            </a:r>
+          </a:p>
+          <a:p>
+            <a:pPr lvl="2"/>
+            <a:r>
+              <a:rPr lang="nl-NL" dirty="0" smtClean="0"/>
+              <a:t>Settings fot the Drone IP Adress and clock speed</a:t>
+            </a:r>
+          </a:p>
+          <a:p>
+            <a:pPr lvl="2"/>
+            <a:r>
+              <a:rPr lang="nl-NL" dirty="0" smtClean="0"/>
+              <a:t>Selection of “Build” versus “Build, load and run” as default Simulink “Build” behaviour</a:t>
+            </a:r>
+            <a:endParaRPr lang="nl-NL" dirty="0"/>
+          </a:p>
+        </p:txBody>
+      </p:sp>
+    </p:spTree>
+    <p:extLst>
+      <p:ext uri="{BB962C8B-B14F-4D97-AF65-F5344CB8AC3E}">
+        <p14:creationId xmlns:p14="http://schemas.microsoft.com/office/powerpoint/2010/main" val="679587418"/>
+      </p:ext>
+    </p:extLst>
+  </p:cSld>
+  <p:clrMapOvr>
+    <a:masterClrMapping/>
+  </p:clrMapOvr>
+</p:sld>
+</file>
+
+<file path=ppt/slides/slide7.xml><?xml version="1.0" encoding="utf-8"?>
+<p:sld xmlns:a="http://schemas.openxmlformats.org/drawingml/2006/main" xmlns:r="http://schemas.openxmlformats.org/officeDocument/2006/relationships" xmlns:p="http://schemas.openxmlformats.org/presentationml/2006/main">
+  <p:cSld>
+    <p:spTree>
+      <p:nvGrpSpPr>
+        <p:cNvPr id="1" name=""/>
+        <p:cNvGrpSpPr/>
+        <p:nvPr/>
+      </p:nvGrpSpPr>
+      <p:grpSpPr>
+        <a:xfrm>
+          <a:off x="0" y="0"/>
+          <a:ext cx="0" cy="0"/>
+          <a:chOff x="0" y="0"/>
+          <a:chExt cx="0" cy="0"/>
+        </a:xfrm>
+      </p:grpSpPr>
+      <p:sp>
+        <p:nvSpPr>
+          <p:cNvPr id="2" name="Title 1"/>
+          <p:cNvSpPr>
+            <a:spLocks noGrp="1"/>
+          </p:cNvSpPr>
+          <p:nvPr>
+            <p:ph type="title"/>
+          </p:nvPr>
+        </p:nvSpPr>
+        <p:spPr/>
+        <p:txBody>
+          <a:bodyPr/>
+          <a:lstStyle/>
+          <a:p>
+            <a:r>
+              <a:rPr lang="nl-NL" dirty="0" smtClean="0"/>
+              <a:t>arm_cortex_a8_AttributeInfo.xml</a:t>
+            </a:r>
+            <a:r>
+              <a:rPr lang="nl-NL" dirty="0"/>
+              <a:t/>
+            </a:r>
+            <a:br>
+              <a:rPr lang="nl-NL" dirty="0"/>
+            </a:br>
+            <a:endParaRPr lang="nl-NL" dirty="0"/>
+          </a:p>
+        </p:txBody>
+      </p:sp>
+      <p:sp>
+        <p:nvSpPr>
+          <p:cNvPr id="3" name="Content Placeholder 2"/>
+          <p:cNvSpPr>
+            <a:spLocks noGrp="1"/>
+          </p:cNvSpPr>
+          <p:nvPr>
+            <p:ph idx="1"/>
+          </p:nvPr>
+        </p:nvSpPr>
+        <p:spPr/>
+        <p:txBody>
+          <a:bodyPr/>
+          <a:lstStyle/>
+          <a:p>
+            <a:pPr lvl="1"/>
+            <a:r>
+              <a:rPr lang="nl-NL" dirty="0"/>
+              <a:t>Purpose</a:t>
+            </a:r>
+            <a:r>
+              <a:rPr lang="nl-NL" dirty="0" smtClean="0"/>
+              <a:t>:</a:t>
+            </a:r>
+          </a:p>
+          <a:p>
+            <a:pPr lvl="2"/>
+            <a:r>
+              <a:rPr lang="nl-NL" dirty="0" smtClean="0"/>
+              <a:t>Set the AR Drone specific code generation flags</a:t>
+            </a:r>
+          </a:p>
+          <a:p>
+            <a:pPr lvl="2"/>
+            <a:r>
+              <a:rPr lang="nl-NL" dirty="0" smtClean="0"/>
+              <a:t>Enbale the Drone to communicate via External Mode with Simulink</a:t>
+            </a:r>
+          </a:p>
+          <a:p>
+            <a:pPr lvl="1"/>
+            <a:r>
+              <a:rPr lang="nl-NL" dirty="0" smtClean="0"/>
+              <a:t>Invoked </a:t>
+            </a:r>
+            <a:r>
+              <a:rPr lang="nl-NL" dirty="0"/>
+              <a:t>by:</a:t>
+            </a:r>
+          </a:p>
+          <a:p>
+            <a:pPr lvl="2"/>
+            <a:r>
+              <a:rPr lang="nl-NL" dirty="0" smtClean="0"/>
+              <a:t>AR_Drone_2_thread.xml</a:t>
+            </a:r>
+            <a:endParaRPr lang="nl-NL" dirty="0"/>
+          </a:p>
+          <a:p>
+            <a:pPr lvl="1"/>
+            <a:r>
+              <a:rPr lang="nl-NL" dirty="0" smtClean="0"/>
+              <a:t>Contains:</a:t>
+            </a:r>
+          </a:p>
+          <a:p>
+            <a:pPr lvl="2"/>
+            <a:r>
+              <a:rPr lang="nl-NL" dirty="0" smtClean="0"/>
+              <a:t>ARM specific compiler, assembler and linker flags</a:t>
+            </a:r>
+          </a:p>
+          <a:p>
+            <a:pPr lvl="2"/>
+            <a:r>
+              <a:rPr lang="nl-NL" dirty="0" smtClean="0"/>
+              <a:t>Location of the External Mode rtiostream files (tcpip)</a:t>
+            </a:r>
+          </a:p>
+        </p:txBody>
+      </p:sp>
+    </p:spTree>
+    <p:extLst>
+      <p:ext uri="{BB962C8B-B14F-4D97-AF65-F5344CB8AC3E}">
+        <p14:creationId xmlns:p14="http://schemas.microsoft.com/office/powerpoint/2010/main" val="2297659202"/>
+      </p:ext>
+    </p:extLst>
+  </p:cSld>
+  <p:clrMapOvr>
+    <a:masterClrMapping/>
+  </p:clrMapOvr>
+</p:sld>
+</file>
+
 <file path=ppt/theme/theme1.xml><?xml version="1.0" encoding="utf-8"?>
 <a:theme xmlns:a="http://schemas.openxmlformats.org/drawingml/2006/main" name="MW_Public_widescreen">
   <a:themeElements>

</xml_diff>

<commit_message>
IP adress no longer hardcoded
fix #1
</commit_message>
<xml_diff>
--- a/Docs/Generating code for the AR Drone 2.pptx
+++ b/Docs/Generating code for the AR Drone 2.pptx
@@ -5,19 +5,22 @@
     <p:sldMasterId id="2147483648" r:id="rId1"/>
   </p:sldMasterIdLst>
   <p:notesMasterIdLst>
-    <p:notesMasterId r:id="rId9"/>
+    <p:notesMasterId r:id="rId12"/>
   </p:notesMasterIdLst>
   <p:handoutMasterIdLst>
-    <p:handoutMasterId r:id="rId10"/>
+    <p:handoutMasterId r:id="rId13"/>
   </p:handoutMasterIdLst>
   <p:sldIdLst>
     <p:sldId id="256" r:id="rId2"/>
     <p:sldId id="276" r:id="rId3"/>
     <p:sldId id="278" r:id="rId4"/>
     <p:sldId id="279" r:id="rId5"/>
-    <p:sldId id="280" r:id="rId6"/>
-    <p:sldId id="281" r:id="rId7"/>
-    <p:sldId id="282" r:id="rId8"/>
+    <p:sldId id="285" r:id="rId6"/>
+    <p:sldId id="284" r:id="rId7"/>
+    <p:sldId id="280" r:id="rId8"/>
+    <p:sldId id="281" r:id="rId9"/>
+    <p:sldId id="282" r:id="rId10"/>
+    <p:sldId id="283" r:id="rId11"/>
   </p:sldIdLst>
   <p:sldSz cx="12192000" cy="6858000"/>
   <p:notesSz cx="6858000" cy="9144000"/>
@@ -125,9 +128,12 @@
             <p14:sldId id="276"/>
             <p14:sldId id="278"/>
             <p14:sldId id="279"/>
+            <p14:sldId id="285"/>
+            <p14:sldId id="284"/>
             <p14:sldId id="280"/>
             <p14:sldId id="281"/>
             <p14:sldId id="282"/>
+            <p14:sldId id="283"/>
           </p14:sldIdLst>
         </p14:section>
       </p14:sectionLst>
@@ -2041,240 +2047,6 @@
       <dsp:cNvGrpSpPr/>
     </dsp:nvGrpSpPr>
     <dsp:grpSpPr/>
-    <dsp:sp modelId="{B223AF9C-DA87-4D10-89AC-1A59FB340D77}">
-      <dsp:nvSpPr>
-        <dsp:cNvPr id="0" name=""/>
-        <dsp:cNvSpPr/>
-      </dsp:nvSpPr>
-      <dsp:spPr>
-        <a:xfrm>
-          <a:off x="5599" y="331226"/>
-          <a:ext cx="4464546" cy="1785818"/>
-        </a:xfrm>
-        <a:prstGeom prst="chevron">
-          <a:avLst/>
-        </a:prstGeom>
-        <a:solidFill>
-          <a:schemeClr val="accent1">
-            <a:hueOff val="0"/>
-            <a:satOff val="0"/>
-            <a:lumOff val="0"/>
-            <a:alphaOff val="0"/>
-          </a:schemeClr>
-        </a:solidFill>
-        <a:ln w="25400" cap="flat" cmpd="sng" algn="ctr">
-          <a:solidFill>
-            <a:schemeClr val="lt1">
-              <a:hueOff val="0"/>
-              <a:satOff val="0"/>
-              <a:lumOff val="0"/>
-              <a:alphaOff val="0"/>
-            </a:schemeClr>
-          </a:solidFill>
-          <a:prstDash val="solid"/>
-        </a:ln>
-        <a:effectLst/>
-      </dsp:spPr>
-      <dsp:style>
-        <a:lnRef idx="2">
-          <a:scrgbClr r="0" g="0" b="0"/>
-        </a:lnRef>
-        <a:fillRef idx="1">
-          <a:scrgbClr r="0" g="0" b="0"/>
-        </a:fillRef>
-        <a:effectRef idx="0">
-          <a:scrgbClr r="0" g="0" b="0"/>
-        </a:effectRef>
-        <a:fontRef idx="minor">
-          <a:schemeClr val="lt1"/>
-        </a:fontRef>
-      </dsp:style>
-      <dsp:txBody>
-        <a:bodyPr spcFirstLastPara="0" vert="horz" wrap="square" lIns="68580" tIns="34290" rIns="0" bIns="34290" numCol="1" spcCol="1270" anchor="ctr" anchorCtr="0">
-          <a:noAutofit/>
-        </a:bodyPr>
-        <a:lstStyle/>
-        <a:p>
-          <a:pPr lvl="0" algn="ctr" defTabSz="2400300">
-            <a:lnSpc>
-              <a:spcPct val="90000"/>
-            </a:lnSpc>
-            <a:spcBef>
-              <a:spcPct val="0"/>
-            </a:spcBef>
-            <a:spcAft>
-              <a:spcPct val="35000"/>
-            </a:spcAft>
-          </a:pPr>
-          <a:r>
-            <a:rPr lang="nl-NL" sz="5400" kern="1200" dirty="0" smtClean="0"/>
-            <a:t>Simulink Model</a:t>
-          </a:r>
-          <a:endParaRPr lang="nl-NL" sz="5400" kern="1200" dirty="0"/>
-        </a:p>
-      </dsp:txBody>
-      <dsp:txXfrm>
-        <a:off x="898508" y="331226"/>
-        <a:ext cx="2678728" cy="1785818"/>
-      </dsp:txXfrm>
-    </dsp:sp>
-    <dsp:sp modelId="{69C763B0-79B3-4C8F-AE21-8321731021B5}">
-      <dsp:nvSpPr>
-        <dsp:cNvPr id="0" name=""/>
-        <dsp:cNvSpPr/>
-      </dsp:nvSpPr>
-      <dsp:spPr>
-        <a:xfrm>
-          <a:off x="3889755" y="483021"/>
-          <a:ext cx="3687453" cy="1482229"/>
-        </a:xfrm>
-        <a:prstGeom prst="chevron">
-          <a:avLst/>
-        </a:prstGeom>
-        <a:solidFill>
-          <a:schemeClr val="accent1">
-            <a:alpha val="90000"/>
-            <a:tint val="40000"/>
-            <a:hueOff val="0"/>
-            <a:satOff val="0"/>
-            <a:lumOff val="0"/>
-            <a:alphaOff val="0"/>
-          </a:schemeClr>
-        </a:solidFill>
-        <a:ln w="25400" cap="flat" cmpd="sng" algn="ctr">
-          <a:solidFill>
-            <a:schemeClr val="accent1">
-              <a:alpha val="90000"/>
-              <a:tint val="40000"/>
-              <a:hueOff val="0"/>
-              <a:satOff val="0"/>
-              <a:lumOff val="0"/>
-              <a:alphaOff val="0"/>
-            </a:schemeClr>
-          </a:solidFill>
-          <a:prstDash val="solid"/>
-        </a:ln>
-        <a:effectLst/>
-      </dsp:spPr>
-      <dsp:style>
-        <a:lnRef idx="2">
-          <a:scrgbClr r="0" g="0" b="0"/>
-        </a:lnRef>
-        <a:fillRef idx="1">
-          <a:scrgbClr r="0" g="0" b="0"/>
-        </a:fillRef>
-        <a:effectRef idx="0">
-          <a:scrgbClr r="0" g="0" b="0"/>
-        </a:effectRef>
-        <a:fontRef idx="minor"/>
-      </dsp:style>
-      <dsp:txBody>
-        <a:bodyPr spcFirstLastPara="0" vert="horz" wrap="square" lIns="31750" tIns="15875" rIns="0" bIns="15875" numCol="1" spcCol="1270" anchor="ctr" anchorCtr="0">
-          <a:noAutofit/>
-        </a:bodyPr>
-        <a:lstStyle/>
-        <a:p>
-          <a:pPr lvl="0" algn="ctr" defTabSz="1111250">
-            <a:lnSpc>
-              <a:spcPct val="90000"/>
-            </a:lnSpc>
-            <a:spcBef>
-              <a:spcPct val="0"/>
-            </a:spcBef>
-            <a:spcAft>
-              <a:spcPct val="35000"/>
-            </a:spcAft>
-          </a:pPr>
-          <a:r>
-            <a:rPr lang="nl-NL" sz="2500" kern="1200" dirty="0" smtClean="0"/>
-            <a:t>To C code for embedded target</a:t>
-          </a:r>
-        </a:p>
-      </dsp:txBody>
-      <dsp:txXfrm>
-        <a:off x="4630870" y="483021"/>
-        <a:ext cx="2205224" cy="1482229"/>
-      </dsp:txXfrm>
-    </dsp:sp>
-    <dsp:sp modelId="{C4A9AAD0-3114-4E1A-B79D-30A1D8873DEF}">
-      <dsp:nvSpPr>
-        <dsp:cNvPr id="0" name=""/>
-        <dsp:cNvSpPr/>
-      </dsp:nvSpPr>
-      <dsp:spPr>
-        <a:xfrm>
-          <a:off x="7058428" y="483021"/>
-          <a:ext cx="3705573" cy="1482229"/>
-        </a:xfrm>
-        <a:prstGeom prst="chevron">
-          <a:avLst/>
-        </a:prstGeom>
-        <a:solidFill>
-          <a:schemeClr val="accent1">
-            <a:alpha val="90000"/>
-            <a:tint val="40000"/>
-            <a:hueOff val="0"/>
-            <a:satOff val="0"/>
-            <a:lumOff val="0"/>
-            <a:alphaOff val="0"/>
-          </a:schemeClr>
-        </a:solidFill>
-        <a:ln w="25400" cap="flat" cmpd="sng" algn="ctr">
-          <a:solidFill>
-            <a:schemeClr val="accent1">
-              <a:alpha val="90000"/>
-              <a:tint val="40000"/>
-              <a:hueOff val="0"/>
-              <a:satOff val="0"/>
-              <a:lumOff val="0"/>
-              <a:alphaOff val="0"/>
-            </a:schemeClr>
-          </a:solidFill>
-          <a:prstDash val="solid"/>
-        </a:ln>
-        <a:effectLst/>
-      </dsp:spPr>
-      <dsp:style>
-        <a:lnRef idx="2">
-          <a:scrgbClr r="0" g="0" b="0"/>
-        </a:lnRef>
-        <a:fillRef idx="1">
-          <a:scrgbClr r="0" g="0" b="0"/>
-        </a:fillRef>
-        <a:effectRef idx="0">
-          <a:scrgbClr r="0" g="0" b="0"/>
-        </a:effectRef>
-        <a:fontRef idx="minor"/>
-      </dsp:style>
-      <dsp:txBody>
-        <a:bodyPr spcFirstLastPara="0" vert="horz" wrap="square" lIns="31750" tIns="15875" rIns="0" bIns="15875" numCol="1" spcCol="1270" anchor="ctr" anchorCtr="0">
-          <a:noAutofit/>
-        </a:bodyPr>
-        <a:lstStyle/>
-        <a:p>
-          <a:pPr lvl="0" algn="ctr" defTabSz="1111250">
-            <a:lnSpc>
-              <a:spcPct val="90000"/>
-            </a:lnSpc>
-            <a:spcBef>
-              <a:spcPct val="0"/>
-            </a:spcBef>
-            <a:spcAft>
-              <a:spcPct val="35000"/>
-            </a:spcAft>
-          </a:pPr>
-          <a:r>
-            <a:rPr lang="nl-NL" sz="2500" kern="1200" dirty="0" smtClean="0"/>
-            <a:t>Compile to target (Codesourcery)</a:t>
-          </a:r>
-          <a:endParaRPr lang="nl-NL" sz="2500" kern="1200" dirty="0"/>
-        </a:p>
-      </dsp:txBody>
-      <dsp:txXfrm>
-        <a:off x="7799543" y="483021"/>
-        <a:ext cx="2223344" cy="1482229"/>
-      </dsp:txXfrm>
-    </dsp:sp>
   </dsp:spTree>
 </dsp:drawing>
 </file>
@@ -2287,154 +2059,6 @@
       <dsp:cNvGrpSpPr/>
     </dsp:nvGrpSpPr>
     <dsp:grpSpPr/>
-    <dsp:sp modelId="{B223AF9C-DA87-4D10-89AC-1A59FB340D77}">
-      <dsp:nvSpPr>
-        <dsp:cNvPr id="0" name=""/>
-        <dsp:cNvSpPr/>
-      </dsp:nvSpPr>
-      <dsp:spPr>
-        <a:xfrm>
-          <a:off x="3053" y="243864"/>
-          <a:ext cx="3411394" cy="1960543"/>
-        </a:xfrm>
-        <a:prstGeom prst="chevron">
-          <a:avLst/>
-        </a:prstGeom>
-        <a:solidFill>
-          <a:schemeClr val="accent1">
-            <a:hueOff val="0"/>
-            <a:satOff val="0"/>
-            <a:lumOff val="0"/>
-            <a:alphaOff val="0"/>
-          </a:schemeClr>
-        </a:solidFill>
-        <a:ln w="25400" cap="flat" cmpd="sng" algn="ctr">
-          <a:solidFill>
-            <a:schemeClr val="lt1">
-              <a:hueOff val="0"/>
-              <a:satOff val="0"/>
-              <a:lumOff val="0"/>
-              <a:alphaOff val="0"/>
-            </a:schemeClr>
-          </a:solidFill>
-          <a:prstDash val="solid"/>
-        </a:ln>
-        <a:effectLst/>
-      </dsp:spPr>
-      <dsp:style>
-        <a:lnRef idx="2">
-          <a:scrgbClr r="0" g="0" b="0"/>
-        </a:lnRef>
-        <a:fillRef idx="1">
-          <a:scrgbClr r="0" g="0" b="0"/>
-        </a:fillRef>
-        <a:effectRef idx="0">
-          <a:scrgbClr r="0" g="0" b="0"/>
-        </a:effectRef>
-        <a:fontRef idx="minor">
-          <a:schemeClr val="lt1"/>
-        </a:fontRef>
-      </dsp:style>
-      <dsp:txBody>
-        <a:bodyPr spcFirstLastPara="0" vert="horz" wrap="square" lIns="25400" tIns="12700" rIns="0" bIns="12700" numCol="1" spcCol="1270" anchor="ctr" anchorCtr="0">
-          <a:noAutofit/>
-        </a:bodyPr>
-        <a:lstStyle/>
-        <a:p>
-          <a:pPr lvl="0" algn="ctr" defTabSz="889000">
-            <a:lnSpc>
-              <a:spcPct val="90000"/>
-            </a:lnSpc>
-            <a:spcBef>
-              <a:spcPct val="0"/>
-            </a:spcBef>
-            <a:spcAft>
-              <a:spcPct val="35000"/>
-            </a:spcAft>
-          </a:pPr>
-          <a:endParaRPr lang="nl-NL" sz="2000" kern="1200" dirty="0"/>
-        </a:p>
-      </dsp:txBody>
-      <dsp:txXfrm>
-        <a:off x="983325" y="243864"/>
-        <a:ext cx="1450851" cy="1960543"/>
-      </dsp:txXfrm>
-    </dsp:sp>
-    <dsp:sp modelId="{69C763B0-79B3-4C8F-AE21-8321731021B5}">
-      <dsp:nvSpPr>
-        <dsp:cNvPr id="0" name=""/>
-        <dsp:cNvSpPr/>
-      </dsp:nvSpPr>
-      <dsp:spPr>
-        <a:xfrm>
-          <a:off x="2732752" y="417637"/>
-          <a:ext cx="4048234" cy="1627251"/>
-        </a:xfrm>
-        <a:prstGeom prst="chevron">
-          <a:avLst/>
-        </a:prstGeom>
-        <a:solidFill>
-          <a:schemeClr val="accent1">
-            <a:alpha val="90000"/>
-            <a:tint val="40000"/>
-            <a:hueOff val="0"/>
-            <a:satOff val="0"/>
-            <a:lumOff val="0"/>
-            <a:alphaOff val="0"/>
-          </a:schemeClr>
-        </a:solidFill>
-        <a:ln w="25400" cap="flat" cmpd="sng" algn="ctr">
-          <a:solidFill>
-            <a:schemeClr val="accent1">
-              <a:alpha val="90000"/>
-              <a:tint val="40000"/>
-              <a:hueOff val="0"/>
-              <a:satOff val="0"/>
-              <a:lumOff val="0"/>
-              <a:alphaOff val="0"/>
-            </a:schemeClr>
-          </a:solidFill>
-          <a:prstDash val="solid"/>
-        </a:ln>
-        <a:effectLst/>
-      </dsp:spPr>
-      <dsp:style>
-        <a:lnRef idx="2">
-          <a:scrgbClr r="0" g="0" b="0"/>
-        </a:lnRef>
-        <a:fillRef idx="1">
-          <a:scrgbClr r="0" g="0" b="0"/>
-        </a:fillRef>
-        <a:effectRef idx="0">
-          <a:scrgbClr r="0" g="0" b="0"/>
-        </a:effectRef>
-        <a:fontRef idx="minor"/>
-      </dsp:style>
-      <dsp:txBody>
-        <a:bodyPr spcFirstLastPara="0" vert="horz" wrap="square" lIns="25400" tIns="12700" rIns="0" bIns="12700" numCol="1" spcCol="1270" anchor="ctr" anchorCtr="0">
-          <a:noAutofit/>
-        </a:bodyPr>
-        <a:lstStyle/>
-        <a:p>
-          <a:pPr lvl="0" algn="ctr" defTabSz="889000">
-            <a:lnSpc>
-              <a:spcPct val="90000"/>
-            </a:lnSpc>
-            <a:spcBef>
-              <a:spcPct val="0"/>
-            </a:spcBef>
-            <a:spcAft>
-              <a:spcPct val="35000"/>
-            </a:spcAft>
-          </a:pPr>
-          <a:endParaRPr lang="nl-NL" sz="2000" kern="1200" dirty="0" smtClean="0"/>
-        </a:p>
-      </dsp:txBody>
-      <dsp:txXfrm>
-        <a:off x="3546378" y="417637"/>
-        <a:ext cx="2420983" cy="1627251"/>
-      </dsp:txXfrm>
-    </dsp:sp>
   </dsp:spTree>
 </dsp:drawing>
 </file>
@@ -5152,7 +4776,7 @@
             <a:fld id="{5F993C83-2184-4286-ABE1-941A40B40C8F}" type="datetimeFigureOut">
               <a:rPr lang="en-US" smtClean="0"/>
               <a:pPr/>
-              <a:t>5/11/2016</a:t>
+              <a:t>5/17/2016</a:t>
             </a:fld>
             <a:endParaRPr lang="en-US"/>
           </a:p>
@@ -5319,7 +4943,7 @@
             <a:fld id="{6053241F-7ED4-45AC-844C-15DB0D5F9CCD}" type="datetimeFigureOut">
               <a:rPr lang="en-US" smtClean="0"/>
               <a:pPr/>
-              <a:t>5/11/2016</a:t>
+              <a:t>5/17/2016</a:t>
             </a:fld>
             <a:endParaRPr lang="en-US"/>
           </a:p>
@@ -7456,6 +7080,74 @@
       </p:par>
     </p:tnLst>
   </p:timing>
+</p:sld>
+</file>
+
+<file path=ppt/slides/slide10.xml><?xml version="1.0" encoding="utf-8"?>
+<p:sld xmlns:a="http://schemas.openxmlformats.org/drawingml/2006/main" xmlns:r="http://schemas.openxmlformats.org/officeDocument/2006/relationships" xmlns:p="http://schemas.openxmlformats.org/presentationml/2006/main">
+  <p:cSld>
+    <p:spTree>
+      <p:nvGrpSpPr>
+        <p:cNvPr id="1" name=""/>
+        <p:cNvGrpSpPr/>
+        <p:nvPr/>
+      </p:nvGrpSpPr>
+      <p:grpSpPr>
+        <a:xfrm>
+          <a:off x="0" y="0"/>
+          <a:ext cx="0" cy="0"/>
+          <a:chOff x="0" y="0"/>
+          <a:chExt cx="0" cy="0"/>
+        </a:xfrm>
+      </p:grpSpPr>
+      <p:sp>
+        <p:nvSpPr>
+          <p:cNvPr id="2" name="Title 1"/>
+          <p:cNvSpPr>
+            <a:spLocks noGrp="1"/>
+          </p:cNvSpPr>
+          <p:nvPr>
+            <p:ph type="title"/>
+          </p:nvPr>
+        </p:nvSpPr>
+        <p:spPr/>
+        <p:txBody>
+          <a:bodyPr/>
+          <a:lstStyle/>
+          <a:p>
+            <a:endParaRPr lang="nl-NL" dirty="0"/>
+          </a:p>
+        </p:txBody>
+      </p:sp>
+      <p:sp>
+        <p:nvSpPr>
+          <p:cNvPr id="3" name="Content Placeholder 2"/>
+          <p:cNvSpPr>
+            <a:spLocks noGrp="1"/>
+          </p:cNvSpPr>
+          <p:nvPr>
+            <p:ph idx="1"/>
+          </p:nvPr>
+        </p:nvSpPr>
+        <p:spPr/>
+        <p:txBody>
+          <a:bodyPr/>
+          <a:lstStyle/>
+          <a:p>
+            <a:endParaRPr lang="nl-NL" dirty="0"/>
+          </a:p>
+        </p:txBody>
+      </p:sp>
+    </p:spTree>
+    <p:extLst>
+      <p:ext uri="{BB962C8B-B14F-4D97-AF65-F5344CB8AC3E}">
+        <p14:creationId xmlns:p14="http://schemas.microsoft.com/office/powerpoint/2010/main" val="1768628979"/>
+      </p:ext>
+    </p:extLst>
+  </p:cSld>
+  <p:clrMapOvr>
+    <a:masterClrMapping/>
+  </p:clrMapOvr>
 </p:sld>
 </file>
 
@@ -10335,10 +10027,10 @@
           <a:lstStyle/>
           <a:p>
             <a:r>
-              <a:rPr lang="nl-NL" dirty="0" smtClean="0"/>
-              <a:t>AR_Drone_2_thead.xml</a:t>
-            </a:r>
-            <a:endParaRPr lang="nl-NL" dirty="0"/>
+              <a:rPr lang="nl-NL" b="0" smtClean="0"/>
+              <a:t>rtwTargetInfo.m</a:t>
+            </a:r>
+            <a:endParaRPr lang="nl-NL" b="0"/>
           </a:p>
         </p:txBody>
       </p:sp>
@@ -10359,117 +10051,70 @@
           <a:p>
             <a:pPr lvl="1"/>
             <a:r>
+              <a:rPr lang="nl-NL" dirty="0"/>
+              <a:t>Purpose:</a:t>
+            </a:r>
+          </a:p>
+          <a:p>
+            <a:pPr lvl="1"/>
+            <a:r>
               <a:rPr lang="nl-NL" dirty="0" smtClean="0"/>
-              <a:t>Purpose:</a:t>
+              <a:t>Invoked </a:t>
+            </a:r>
+            <a:r>
+              <a:rPr lang="nl-NL" dirty="0"/>
+              <a:t>by</a:t>
+            </a:r>
+            <a:r>
+              <a:rPr lang="nl-NL" dirty="0" smtClean="0"/>
+              <a:t>:</a:t>
             </a:r>
           </a:p>
           <a:p>
             <a:pPr lvl="2"/>
             <a:r>
               <a:rPr lang="nl-NL" dirty="0" smtClean="0"/>
-              <a:t>Create custom user options required for the “Build, load and run” process</a:t>
-            </a:r>
-          </a:p>
-          <a:p>
-            <a:pPr lvl="2"/>
-            <a:r>
-              <a:rPr lang="nl-NL" smtClean="0"/>
-              <a:t>Specify target specific flags and external mode files</a:t>
-            </a:r>
-            <a:endParaRPr lang="nl-NL" dirty="0" smtClean="0"/>
+              <a:t>Build process if no config is set</a:t>
+            </a:r>
+          </a:p>
+          <a:p>
+            <a:pPr lvl="3"/>
+            <a:r>
+              <a:rPr lang="nl-NL"/>
+              <a:t>Can be reloaded via “RTW.TargetRegistry.getInstance('reset')”</a:t>
+            </a:r>
+            <a:endParaRPr lang="nl-NL" dirty="0"/>
           </a:p>
           <a:p>
             <a:pPr lvl="1"/>
             <a:r>
               <a:rPr lang="nl-NL" dirty="0" smtClean="0"/>
-              <a:t>Invoked by:</a:t>
-            </a:r>
-          </a:p>
-          <a:p>
-            <a:pPr lvl="2"/>
-            <a:r>
-              <a:rPr lang="nl-NL" dirty="0" smtClean="0">
-                <a:solidFill>
-                  <a:srgbClr val="FF0000"/>
-                </a:solidFill>
-              </a:rPr>
-              <a:t>??????????</a:t>
+              <a:t>Appears </a:t>
+            </a:r>
+            <a:r>
+              <a:rPr lang="nl-NL" dirty="0"/>
+              <a:t>to the user as:</a:t>
             </a:r>
           </a:p>
           <a:p>
             <a:pPr lvl="1"/>
             <a:r>
-              <a:rPr lang="nl-NL" dirty="0" smtClean="0"/>
-              <a:t>Appears to the user as:</a:t>
-            </a:r>
-          </a:p>
-          <a:p>
-            <a:pPr lvl="2"/>
-            <a:r>
-              <a:rPr lang="nl-NL" dirty="0" smtClean="0"/>
-              <a:t>Configuration parameters &gt; Hardware Implementation &gt; Hardware Board</a:t>
-            </a:r>
-          </a:p>
-          <a:p>
-            <a:pPr lvl="2"/>
-            <a:r>
               <a:rPr lang="nl-NL" dirty="0"/>
-              <a:t>Configuration </a:t>
-            </a:r>
-            <a:r>
-              <a:rPr lang="nl-NL" dirty="0" smtClean="0"/>
-              <a:t>parameters &gt; Code Generation &gt; Toolchain</a:t>
+              <a:t>Contains:</a:t>
             </a:r>
           </a:p>
           <a:p>
             <a:pPr lvl="1"/>
             <a:r>
-              <a:rPr lang="nl-NL" dirty="0" smtClean="0"/>
-              <a:t>Contains:</a:t>
-            </a:r>
-          </a:p>
-          <a:p>
-            <a:pPr lvl="2"/>
-            <a:r>
-              <a:rPr lang="nl-NL" dirty="0" smtClean="0"/>
-              <a:t>User description for the Hardware Board UI and Toolchain name</a:t>
-            </a:r>
-          </a:p>
-          <a:p>
-            <a:pPr lvl="2"/>
-            <a:r>
-              <a:rPr lang="nl-NL" dirty="0" smtClean="0"/>
-              <a:t>Commands passed to the ssh_download.bat script </a:t>
-            </a:r>
-          </a:p>
-          <a:p>
-            <a:pPr lvl="2"/>
-            <a:r>
-              <a:rPr lang="nl-NL" dirty="0" smtClean="0"/>
-              <a:t>Location of the MATLAB linux codertarget XML file</a:t>
-            </a:r>
-          </a:p>
-          <a:p>
-            <a:pPr lvl="1"/>
-            <a:r>
-              <a:rPr lang="nl-NL" dirty="0" smtClean="0"/>
+              <a:rPr lang="nl-NL" dirty="0"/>
               <a:t>Custom file pointers:</a:t>
             </a:r>
-            <a:endParaRPr lang="nl-NL" u="sng" dirty="0" smtClean="0"/>
-          </a:p>
-          <a:p>
-            <a:pPr lvl="2"/>
-            <a:r>
-              <a:rPr lang="nl-NL" dirty="0" smtClean="0"/>
-              <a:t>arm_cortex_a8_ParameterInfo.xml</a:t>
-            </a:r>
-          </a:p>
-          <a:p>
-            <a:pPr lvl="2"/>
-            <a:r>
-              <a:rPr lang="nl-NL" dirty="0" smtClean="0"/>
-              <a:t>arm_cortex_a8_AttributeInfo.xml</a:t>
-            </a:r>
+            <a:endParaRPr lang="nl-NL" u="sng" dirty="0"/>
+          </a:p>
+          <a:p>
+            <a:endParaRPr lang="nl-NL" dirty="0"/>
+          </a:p>
+          <a:p>
             <a:endParaRPr lang="nl-NL" dirty="0"/>
           </a:p>
         </p:txBody>
@@ -10477,7 +10122,7 @@
     </p:spTree>
     <p:extLst>
       <p:ext uri="{BB962C8B-B14F-4D97-AF65-F5344CB8AC3E}">
-        <p14:creationId xmlns:p14="http://schemas.microsoft.com/office/powerpoint/2010/main" val="3092856080"/>
+        <p14:creationId xmlns:p14="http://schemas.microsoft.com/office/powerpoint/2010/main" val="930929986"/>
       </p:ext>
     </p:extLst>
   </p:cSld>
@@ -10520,13 +10165,10 @@
           <a:lstStyle/>
           <a:p>
             <a:r>
-              <a:rPr lang="nl-NL" dirty="0"/>
-              <a:t>arm_cortex_a8_ParameterInfo.xml</a:t>
-            </a:r>
-            <a:br>
-              <a:rPr lang="nl-NL" dirty="0"/>
-            </a:br>
-            <a:endParaRPr lang="nl-NL" dirty="0"/>
+              <a:rPr lang="nl-NL" smtClean="0"/>
+              <a:t>sl_customization.m</a:t>
+            </a:r>
+            <a:endParaRPr lang="nl-NL"/>
           </a:p>
         </p:txBody>
       </p:sp>
@@ -10547,6 +10189,345 @@
           <a:p>
             <a:pPr lvl="1"/>
             <a:r>
+              <a:rPr lang="nl-NL"/>
+              <a:t>Purpose</a:t>
+            </a:r>
+            <a:r>
+              <a:rPr lang="nl-NL" smtClean="0"/>
+              <a:t>:</a:t>
+            </a:r>
+          </a:p>
+          <a:p>
+            <a:pPr lvl="2"/>
+            <a:r>
+              <a:rPr lang="nl-NL" smtClean="0"/>
+              <a:t>Register the third party hardware for selection in the configset</a:t>
+            </a:r>
+            <a:endParaRPr lang="nl-NL"/>
+          </a:p>
+          <a:p>
+            <a:pPr lvl="1"/>
+            <a:r>
+              <a:rPr lang="nl-NL" smtClean="0"/>
+              <a:t>Invoked </a:t>
+            </a:r>
+            <a:r>
+              <a:rPr lang="nl-NL"/>
+              <a:t>by</a:t>
+            </a:r>
+            <a:r>
+              <a:rPr lang="nl-NL" smtClean="0"/>
+              <a:t>:</a:t>
+            </a:r>
+          </a:p>
+          <a:p>
+            <a:pPr lvl="2"/>
+            <a:r>
+              <a:rPr lang="nl-NL" smtClean="0"/>
+              <a:t>sl_refresh_customizatins (called on first Simulink Model openening and AR_Drone_Startup.m)</a:t>
+            </a:r>
+          </a:p>
+          <a:p>
+            <a:pPr lvl="1"/>
+            <a:r>
+              <a:rPr lang="nl-NL" smtClean="0"/>
+              <a:t>Appears </a:t>
+            </a:r>
+            <a:r>
+              <a:rPr lang="nl-NL"/>
+              <a:t>to the user as:</a:t>
+            </a:r>
+          </a:p>
+          <a:p>
+            <a:pPr lvl="1"/>
+            <a:r>
+              <a:rPr lang="nl-NL" smtClean="0"/>
+              <a:t>Contains</a:t>
+            </a:r>
+            <a:r>
+              <a:rPr lang="nl-NL"/>
+              <a:t>:</a:t>
+            </a:r>
+          </a:p>
+          <a:p>
+            <a:pPr lvl="1"/>
+            <a:r>
+              <a:rPr lang="nl-NL" smtClean="0"/>
+              <a:t>Custom </a:t>
+            </a:r>
+            <a:r>
+              <a:rPr lang="nl-NL"/>
+              <a:t>file pointers:</a:t>
+            </a:r>
+            <a:endParaRPr lang="nl-NL" u="sng"/>
+          </a:p>
+          <a:p>
+            <a:endParaRPr lang="nl-NL"/>
+          </a:p>
+        </p:txBody>
+      </p:sp>
+    </p:spTree>
+    <p:extLst>
+      <p:ext uri="{BB962C8B-B14F-4D97-AF65-F5344CB8AC3E}">
+        <p14:creationId xmlns:p14="http://schemas.microsoft.com/office/powerpoint/2010/main" val="429758325"/>
+      </p:ext>
+    </p:extLst>
+  </p:cSld>
+  <p:clrMapOvr>
+    <a:masterClrMapping/>
+  </p:clrMapOvr>
+</p:sld>
+</file>
+
+<file path=ppt/slides/slide7.xml><?xml version="1.0" encoding="utf-8"?>
+<p:sld xmlns:a="http://schemas.openxmlformats.org/drawingml/2006/main" xmlns:r="http://schemas.openxmlformats.org/officeDocument/2006/relationships" xmlns:p="http://schemas.openxmlformats.org/presentationml/2006/main">
+  <p:cSld>
+    <p:spTree>
+      <p:nvGrpSpPr>
+        <p:cNvPr id="1" name=""/>
+        <p:cNvGrpSpPr/>
+        <p:nvPr/>
+      </p:nvGrpSpPr>
+      <p:grpSpPr>
+        <a:xfrm>
+          <a:off x="0" y="0"/>
+          <a:ext cx="0" cy="0"/>
+          <a:chOff x="0" y="0"/>
+          <a:chExt cx="0" cy="0"/>
+        </a:xfrm>
+      </p:grpSpPr>
+      <p:sp>
+        <p:nvSpPr>
+          <p:cNvPr id="2" name="Title 1"/>
+          <p:cNvSpPr>
+            <a:spLocks noGrp="1"/>
+          </p:cNvSpPr>
+          <p:nvPr>
+            <p:ph type="title"/>
+          </p:nvPr>
+        </p:nvSpPr>
+        <p:spPr/>
+        <p:txBody>
+          <a:bodyPr/>
+          <a:lstStyle/>
+          <a:p>
+            <a:r>
+              <a:rPr lang="nl-NL" dirty="0" smtClean="0"/>
+              <a:t>AR_Drone_2_thead.xml</a:t>
+            </a:r>
+            <a:endParaRPr lang="nl-NL" dirty="0"/>
+          </a:p>
+        </p:txBody>
+      </p:sp>
+      <p:sp>
+        <p:nvSpPr>
+          <p:cNvPr id="3" name="Content Placeholder 2"/>
+          <p:cNvSpPr>
+            <a:spLocks noGrp="1"/>
+          </p:cNvSpPr>
+          <p:nvPr>
+            <p:ph idx="1"/>
+          </p:nvPr>
+        </p:nvSpPr>
+        <p:spPr/>
+        <p:txBody>
+          <a:bodyPr/>
+          <a:lstStyle/>
+          <a:p>
+            <a:pPr lvl="1"/>
+            <a:r>
+              <a:rPr lang="nl-NL" dirty="0" smtClean="0"/>
+              <a:t>Purpose:</a:t>
+            </a:r>
+          </a:p>
+          <a:p>
+            <a:pPr lvl="2"/>
+            <a:r>
+              <a:rPr lang="nl-NL" dirty="0" smtClean="0"/>
+              <a:t>Create custom user options required for the “Build, load and run” process</a:t>
+            </a:r>
+          </a:p>
+          <a:p>
+            <a:pPr lvl="2"/>
+            <a:r>
+              <a:rPr lang="nl-NL" dirty="0" smtClean="0"/>
+              <a:t>Specify target specific flags and external mode files</a:t>
+            </a:r>
+          </a:p>
+          <a:p>
+            <a:pPr lvl="1"/>
+            <a:r>
+              <a:rPr lang="nl-NL" dirty="0" smtClean="0"/>
+              <a:t>Invoked </a:t>
+            </a:r>
+            <a:r>
+              <a:rPr lang="nl-NL" smtClean="0"/>
+              <a:t>by:</a:t>
+            </a:r>
+          </a:p>
+          <a:p>
+            <a:pPr lvl="2"/>
+            <a:r>
+              <a:rPr lang="nl-NL" smtClean="0"/>
+              <a:t>sl_customization.m</a:t>
+            </a:r>
+            <a:endParaRPr lang="nl-NL" dirty="0" smtClean="0"/>
+          </a:p>
+          <a:p>
+            <a:pPr lvl="1"/>
+            <a:r>
+              <a:rPr lang="nl-NL" smtClean="0"/>
+              <a:t>Appears </a:t>
+            </a:r>
+            <a:r>
+              <a:rPr lang="nl-NL" dirty="0" smtClean="0"/>
+              <a:t>to the user as:</a:t>
+            </a:r>
+          </a:p>
+          <a:p>
+            <a:pPr lvl="2"/>
+            <a:r>
+              <a:rPr lang="nl-NL" dirty="0" smtClean="0"/>
+              <a:t>Configuration parameters &gt; Hardware Implementation &gt; Hardware Board</a:t>
+            </a:r>
+          </a:p>
+          <a:p>
+            <a:pPr lvl="2"/>
+            <a:r>
+              <a:rPr lang="nl-NL" dirty="0"/>
+              <a:t>Configuration </a:t>
+            </a:r>
+            <a:r>
+              <a:rPr lang="nl-NL" dirty="0" smtClean="0"/>
+              <a:t>parameters &gt; Code Generation &gt; Toolchain</a:t>
+            </a:r>
+          </a:p>
+          <a:p>
+            <a:pPr lvl="1"/>
+            <a:r>
+              <a:rPr lang="nl-NL" dirty="0" smtClean="0"/>
+              <a:t>Contains:</a:t>
+            </a:r>
+          </a:p>
+          <a:p>
+            <a:pPr lvl="2"/>
+            <a:r>
+              <a:rPr lang="nl-NL" dirty="0" smtClean="0"/>
+              <a:t>User description for the Hardware Board UI and Toolchain name</a:t>
+            </a:r>
+          </a:p>
+          <a:p>
+            <a:pPr lvl="2"/>
+            <a:r>
+              <a:rPr lang="nl-NL" dirty="0" smtClean="0"/>
+              <a:t>Commands passed to the ssh_download.bat script </a:t>
+            </a:r>
+          </a:p>
+          <a:p>
+            <a:pPr lvl="2"/>
+            <a:r>
+              <a:rPr lang="nl-NL" dirty="0" smtClean="0"/>
+              <a:t>Location of the MATLAB linux codertarget XML file</a:t>
+            </a:r>
+          </a:p>
+          <a:p>
+            <a:pPr lvl="1"/>
+            <a:r>
+              <a:rPr lang="nl-NL" dirty="0" smtClean="0"/>
+              <a:t>Custom file pointers:</a:t>
+            </a:r>
+            <a:endParaRPr lang="nl-NL" u="sng" dirty="0" smtClean="0"/>
+          </a:p>
+          <a:p>
+            <a:pPr lvl="2"/>
+            <a:r>
+              <a:rPr lang="nl-NL" dirty="0" smtClean="0"/>
+              <a:t>arm_cortex_a8_ParameterInfo.xml</a:t>
+            </a:r>
+          </a:p>
+          <a:p>
+            <a:pPr lvl="2"/>
+            <a:r>
+              <a:rPr lang="nl-NL" dirty="0" smtClean="0"/>
+              <a:t>arm_cortex_a8_AttributeInfo.xml</a:t>
+            </a:r>
+            <a:endParaRPr lang="nl-NL" dirty="0"/>
+          </a:p>
+        </p:txBody>
+      </p:sp>
+    </p:spTree>
+    <p:extLst>
+      <p:ext uri="{BB962C8B-B14F-4D97-AF65-F5344CB8AC3E}">
+        <p14:creationId xmlns:p14="http://schemas.microsoft.com/office/powerpoint/2010/main" val="3092856080"/>
+      </p:ext>
+    </p:extLst>
+  </p:cSld>
+  <p:clrMapOvr>
+    <a:masterClrMapping/>
+  </p:clrMapOvr>
+</p:sld>
+</file>
+
+<file path=ppt/slides/slide8.xml><?xml version="1.0" encoding="utf-8"?>
+<p:sld xmlns:a="http://schemas.openxmlformats.org/drawingml/2006/main" xmlns:r="http://schemas.openxmlformats.org/officeDocument/2006/relationships" xmlns:p="http://schemas.openxmlformats.org/presentationml/2006/main">
+  <p:cSld>
+    <p:spTree>
+      <p:nvGrpSpPr>
+        <p:cNvPr id="1" name=""/>
+        <p:cNvGrpSpPr/>
+        <p:nvPr/>
+      </p:nvGrpSpPr>
+      <p:grpSpPr>
+        <a:xfrm>
+          <a:off x="0" y="0"/>
+          <a:ext cx="0" cy="0"/>
+          <a:chOff x="0" y="0"/>
+          <a:chExt cx="0" cy="0"/>
+        </a:xfrm>
+      </p:grpSpPr>
+      <p:sp>
+        <p:nvSpPr>
+          <p:cNvPr id="2" name="Title 1"/>
+          <p:cNvSpPr>
+            <a:spLocks noGrp="1"/>
+          </p:cNvSpPr>
+          <p:nvPr>
+            <p:ph type="title"/>
+          </p:nvPr>
+        </p:nvSpPr>
+        <p:spPr/>
+        <p:txBody>
+          <a:bodyPr/>
+          <a:lstStyle/>
+          <a:p>
+            <a:r>
+              <a:rPr lang="nl-NL" dirty="0"/>
+              <a:t>arm_cortex_a8_ParameterInfo.xml</a:t>
+            </a:r>
+            <a:br>
+              <a:rPr lang="nl-NL" dirty="0"/>
+            </a:br>
+            <a:endParaRPr lang="nl-NL" dirty="0"/>
+          </a:p>
+        </p:txBody>
+      </p:sp>
+      <p:sp>
+        <p:nvSpPr>
+          <p:cNvPr id="3" name="Content Placeholder 2"/>
+          <p:cNvSpPr>
+            <a:spLocks noGrp="1"/>
+          </p:cNvSpPr>
+          <p:nvPr>
+            <p:ph idx="1"/>
+          </p:nvPr>
+        </p:nvSpPr>
+        <p:spPr/>
+        <p:txBody>
+          <a:bodyPr/>
+          <a:lstStyle/>
+          <a:p>
+            <a:pPr lvl="1"/>
+            <a:r>
               <a:rPr lang="nl-NL" dirty="0"/>
               <a:t>Purpose</a:t>
             </a:r>
@@ -10641,7 +10622,7 @@
 </p:sld>
 </file>
 
-<file path=ppt/slides/slide7.xml><?xml version="1.0" encoding="utf-8"?>
+<file path=ppt/slides/slide9.xml><?xml version="1.0" encoding="utf-8"?>
 <p:sld xmlns:a="http://schemas.openxmlformats.org/drawingml/2006/main" xmlns:r="http://schemas.openxmlformats.org/officeDocument/2006/relationships" xmlns:p="http://schemas.openxmlformats.org/presentationml/2006/main">
   <p:cSld>
     <p:spTree>

</xml_diff>

<commit_message>
Simplified example 1 Improved example 2 Changed example 3 to normal mode video streaming Added networking blocks to AR Drone 2 Library Updated documentation of example 2, 3 Started work on example 4: Reading and logging sensor data
</commit_message>
<xml_diff>
--- a/Docs/Generating code for the AR Drone 2.pptx
+++ b/Docs/Generating code for the AR Drone 2.pptx
@@ -5,10 +5,10 @@
     <p:sldMasterId id="2147483648" r:id="rId1"/>
   </p:sldMasterIdLst>
   <p:notesMasterIdLst>
-    <p:notesMasterId r:id="rId12"/>
+    <p:notesMasterId r:id="rId13"/>
   </p:notesMasterIdLst>
   <p:handoutMasterIdLst>
-    <p:handoutMasterId r:id="rId13"/>
+    <p:handoutMasterId r:id="rId14"/>
   </p:handoutMasterIdLst>
   <p:sldIdLst>
     <p:sldId id="256" r:id="rId2"/>
@@ -17,10 +17,11 @@
     <p:sldId id="279" r:id="rId5"/>
     <p:sldId id="285" r:id="rId6"/>
     <p:sldId id="284" r:id="rId7"/>
-    <p:sldId id="280" r:id="rId8"/>
-    <p:sldId id="281" r:id="rId9"/>
-    <p:sldId id="282" r:id="rId10"/>
-    <p:sldId id="283" r:id="rId11"/>
+    <p:sldId id="286" r:id="rId8"/>
+    <p:sldId id="280" r:id="rId9"/>
+    <p:sldId id="281" r:id="rId10"/>
+    <p:sldId id="282" r:id="rId11"/>
+    <p:sldId id="283" r:id="rId12"/>
   </p:sldIdLst>
   <p:sldSz cx="12192000" cy="6858000"/>
   <p:notesSz cx="6858000" cy="9144000"/>
@@ -130,6 +131,7 @@
             <p14:sldId id="279"/>
             <p14:sldId id="285"/>
             <p14:sldId id="284"/>
+            <p14:sldId id="286"/>
             <p14:sldId id="280"/>
             <p14:sldId id="281"/>
             <p14:sldId id="282"/>
@@ -2047,6 +2049,240 @@
       <dsp:cNvGrpSpPr/>
     </dsp:nvGrpSpPr>
     <dsp:grpSpPr/>
+    <dsp:sp modelId="{B223AF9C-DA87-4D10-89AC-1A59FB340D77}">
+      <dsp:nvSpPr>
+        <dsp:cNvPr id="0" name=""/>
+        <dsp:cNvSpPr/>
+      </dsp:nvSpPr>
+      <dsp:spPr>
+        <a:xfrm>
+          <a:off x="5599" y="331226"/>
+          <a:ext cx="4464546" cy="1785818"/>
+        </a:xfrm>
+        <a:prstGeom prst="chevron">
+          <a:avLst/>
+        </a:prstGeom>
+        <a:solidFill>
+          <a:schemeClr val="accent1">
+            <a:hueOff val="0"/>
+            <a:satOff val="0"/>
+            <a:lumOff val="0"/>
+            <a:alphaOff val="0"/>
+          </a:schemeClr>
+        </a:solidFill>
+        <a:ln w="25400" cap="flat" cmpd="sng" algn="ctr">
+          <a:solidFill>
+            <a:schemeClr val="lt1">
+              <a:hueOff val="0"/>
+              <a:satOff val="0"/>
+              <a:lumOff val="0"/>
+              <a:alphaOff val="0"/>
+            </a:schemeClr>
+          </a:solidFill>
+          <a:prstDash val="solid"/>
+        </a:ln>
+        <a:effectLst/>
+      </dsp:spPr>
+      <dsp:style>
+        <a:lnRef idx="2">
+          <a:scrgbClr r="0" g="0" b="0"/>
+        </a:lnRef>
+        <a:fillRef idx="1">
+          <a:scrgbClr r="0" g="0" b="0"/>
+        </a:fillRef>
+        <a:effectRef idx="0">
+          <a:scrgbClr r="0" g="0" b="0"/>
+        </a:effectRef>
+        <a:fontRef idx="minor">
+          <a:schemeClr val="lt1"/>
+        </a:fontRef>
+      </dsp:style>
+      <dsp:txBody>
+        <a:bodyPr spcFirstLastPara="0" vert="horz" wrap="square" lIns="68580" tIns="34290" rIns="0" bIns="34290" numCol="1" spcCol="1270" anchor="ctr" anchorCtr="0">
+          <a:noAutofit/>
+        </a:bodyPr>
+        <a:lstStyle/>
+        <a:p>
+          <a:pPr lvl="0" algn="ctr" defTabSz="2400300">
+            <a:lnSpc>
+              <a:spcPct val="90000"/>
+            </a:lnSpc>
+            <a:spcBef>
+              <a:spcPct val="0"/>
+            </a:spcBef>
+            <a:spcAft>
+              <a:spcPct val="35000"/>
+            </a:spcAft>
+          </a:pPr>
+          <a:r>
+            <a:rPr lang="nl-NL" sz="5400" kern="1200" dirty="0" smtClean="0"/>
+            <a:t>Simulink Model</a:t>
+          </a:r>
+          <a:endParaRPr lang="nl-NL" sz="5400" kern="1200" dirty="0"/>
+        </a:p>
+      </dsp:txBody>
+      <dsp:txXfrm>
+        <a:off x="898508" y="331226"/>
+        <a:ext cx="2678728" cy="1785818"/>
+      </dsp:txXfrm>
+    </dsp:sp>
+    <dsp:sp modelId="{69C763B0-79B3-4C8F-AE21-8321731021B5}">
+      <dsp:nvSpPr>
+        <dsp:cNvPr id="0" name=""/>
+        <dsp:cNvSpPr/>
+      </dsp:nvSpPr>
+      <dsp:spPr>
+        <a:xfrm>
+          <a:off x="3889755" y="483021"/>
+          <a:ext cx="3687453" cy="1482229"/>
+        </a:xfrm>
+        <a:prstGeom prst="chevron">
+          <a:avLst/>
+        </a:prstGeom>
+        <a:solidFill>
+          <a:schemeClr val="accent1">
+            <a:alpha val="90000"/>
+            <a:tint val="40000"/>
+            <a:hueOff val="0"/>
+            <a:satOff val="0"/>
+            <a:lumOff val="0"/>
+            <a:alphaOff val="0"/>
+          </a:schemeClr>
+        </a:solidFill>
+        <a:ln w="25400" cap="flat" cmpd="sng" algn="ctr">
+          <a:solidFill>
+            <a:schemeClr val="accent1">
+              <a:alpha val="90000"/>
+              <a:tint val="40000"/>
+              <a:hueOff val="0"/>
+              <a:satOff val="0"/>
+              <a:lumOff val="0"/>
+              <a:alphaOff val="0"/>
+            </a:schemeClr>
+          </a:solidFill>
+          <a:prstDash val="solid"/>
+        </a:ln>
+        <a:effectLst/>
+      </dsp:spPr>
+      <dsp:style>
+        <a:lnRef idx="2">
+          <a:scrgbClr r="0" g="0" b="0"/>
+        </a:lnRef>
+        <a:fillRef idx="1">
+          <a:scrgbClr r="0" g="0" b="0"/>
+        </a:fillRef>
+        <a:effectRef idx="0">
+          <a:scrgbClr r="0" g="0" b="0"/>
+        </a:effectRef>
+        <a:fontRef idx="minor"/>
+      </dsp:style>
+      <dsp:txBody>
+        <a:bodyPr spcFirstLastPara="0" vert="horz" wrap="square" lIns="31750" tIns="15875" rIns="0" bIns="15875" numCol="1" spcCol="1270" anchor="ctr" anchorCtr="0">
+          <a:noAutofit/>
+        </a:bodyPr>
+        <a:lstStyle/>
+        <a:p>
+          <a:pPr lvl="0" algn="ctr" defTabSz="1111250">
+            <a:lnSpc>
+              <a:spcPct val="90000"/>
+            </a:lnSpc>
+            <a:spcBef>
+              <a:spcPct val="0"/>
+            </a:spcBef>
+            <a:spcAft>
+              <a:spcPct val="35000"/>
+            </a:spcAft>
+          </a:pPr>
+          <a:r>
+            <a:rPr lang="nl-NL" sz="2500" kern="1200" dirty="0" smtClean="0"/>
+            <a:t>To C code for embedded target</a:t>
+          </a:r>
+        </a:p>
+      </dsp:txBody>
+      <dsp:txXfrm>
+        <a:off x="4630870" y="483021"/>
+        <a:ext cx="2205224" cy="1482229"/>
+      </dsp:txXfrm>
+    </dsp:sp>
+    <dsp:sp modelId="{C4A9AAD0-3114-4E1A-B79D-30A1D8873DEF}">
+      <dsp:nvSpPr>
+        <dsp:cNvPr id="0" name=""/>
+        <dsp:cNvSpPr/>
+      </dsp:nvSpPr>
+      <dsp:spPr>
+        <a:xfrm>
+          <a:off x="7058428" y="483021"/>
+          <a:ext cx="3705573" cy="1482229"/>
+        </a:xfrm>
+        <a:prstGeom prst="chevron">
+          <a:avLst/>
+        </a:prstGeom>
+        <a:solidFill>
+          <a:schemeClr val="accent1">
+            <a:alpha val="90000"/>
+            <a:tint val="40000"/>
+            <a:hueOff val="0"/>
+            <a:satOff val="0"/>
+            <a:lumOff val="0"/>
+            <a:alphaOff val="0"/>
+          </a:schemeClr>
+        </a:solidFill>
+        <a:ln w="25400" cap="flat" cmpd="sng" algn="ctr">
+          <a:solidFill>
+            <a:schemeClr val="accent1">
+              <a:alpha val="90000"/>
+              <a:tint val="40000"/>
+              <a:hueOff val="0"/>
+              <a:satOff val="0"/>
+              <a:lumOff val="0"/>
+              <a:alphaOff val="0"/>
+            </a:schemeClr>
+          </a:solidFill>
+          <a:prstDash val="solid"/>
+        </a:ln>
+        <a:effectLst/>
+      </dsp:spPr>
+      <dsp:style>
+        <a:lnRef idx="2">
+          <a:scrgbClr r="0" g="0" b="0"/>
+        </a:lnRef>
+        <a:fillRef idx="1">
+          <a:scrgbClr r="0" g="0" b="0"/>
+        </a:fillRef>
+        <a:effectRef idx="0">
+          <a:scrgbClr r="0" g="0" b="0"/>
+        </a:effectRef>
+        <a:fontRef idx="minor"/>
+      </dsp:style>
+      <dsp:txBody>
+        <a:bodyPr spcFirstLastPara="0" vert="horz" wrap="square" lIns="31750" tIns="15875" rIns="0" bIns="15875" numCol="1" spcCol="1270" anchor="ctr" anchorCtr="0">
+          <a:noAutofit/>
+        </a:bodyPr>
+        <a:lstStyle/>
+        <a:p>
+          <a:pPr lvl="0" algn="ctr" defTabSz="1111250">
+            <a:lnSpc>
+              <a:spcPct val="90000"/>
+            </a:lnSpc>
+            <a:spcBef>
+              <a:spcPct val="0"/>
+            </a:spcBef>
+            <a:spcAft>
+              <a:spcPct val="35000"/>
+            </a:spcAft>
+          </a:pPr>
+          <a:r>
+            <a:rPr lang="nl-NL" sz="2500" kern="1200" dirty="0" smtClean="0"/>
+            <a:t>Compile to target (Codesourcery)</a:t>
+          </a:r>
+          <a:endParaRPr lang="nl-NL" sz="2500" kern="1200" dirty="0"/>
+        </a:p>
+      </dsp:txBody>
+      <dsp:txXfrm>
+        <a:off x="7799543" y="483021"/>
+        <a:ext cx="2223344" cy="1482229"/>
+      </dsp:txXfrm>
+    </dsp:sp>
   </dsp:spTree>
 </dsp:drawing>
 </file>
@@ -2059,6 +2295,154 @@
       <dsp:cNvGrpSpPr/>
     </dsp:nvGrpSpPr>
     <dsp:grpSpPr/>
+    <dsp:sp modelId="{B223AF9C-DA87-4D10-89AC-1A59FB340D77}">
+      <dsp:nvSpPr>
+        <dsp:cNvPr id="0" name=""/>
+        <dsp:cNvSpPr/>
+      </dsp:nvSpPr>
+      <dsp:spPr>
+        <a:xfrm>
+          <a:off x="3053" y="243864"/>
+          <a:ext cx="3411394" cy="1960543"/>
+        </a:xfrm>
+        <a:prstGeom prst="chevron">
+          <a:avLst/>
+        </a:prstGeom>
+        <a:solidFill>
+          <a:schemeClr val="accent1">
+            <a:hueOff val="0"/>
+            <a:satOff val="0"/>
+            <a:lumOff val="0"/>
+            <a:alphaOff val="0"/>
+          </a:schemeClr>
+        </a:solidFill>
+        <a:ln w="25400" cap="flat" cmpd="sng" algn="ctr">
+          <a:solidFill>
+            <a:schemeClr val="lt1">
+              <a:hueOff val="0"/>
+              <a:satOff val="0"/>
+              <a:lumOff val="0"/>
+              <a:alphaOff val="0"/>
+            </a:schemeClr>
+          </a:solidFill>
+          <a:prstDash val="solid"/>
+        </a:ln>
+        <a:effectLst/>
+      </dsp:spPr>
+      <dsp:style>
+        <a:lnRef idx="2">
+          <a:scrgbClr r="0" g="0" b="0"/>
+        </a:lnRef>
+        <a:fillRef idx="1">
+          <a:scrgbClr r="0" g="0" b="0"/>
+        </a:fillRef>
+        <a:effectRef idx="0">
+          <a:scrgbClr r="0" g="0" b="0"/>
+        </a:effectRef>
+        <a:fontRef idx="minor">
+          <a:schemeClr val="lt1"/>
+        </a:fontRef>
+      </dsp:style>
+      <dsp:txBody>
+        <a:bodyPr spcFirstLastPara="0" vert="horz" wrap="square" lIns="25400" tIns="12700" rIns="0" bIns="12700" numCol="1" spcCol="1270" anchor="ctr" anchorCtr="0">
+          <a:noAutofit/>
+        </a:bodyPr>
+        <a:lstStyle/>
+        <a:p>
+          <a:pPr lvl="0" algn="ctr" defTabSz="889000">
+            <a:lnSpc>
+              <a:spcPct val="90000"/>
+            </a:lnSpc>
+            <a:spcBef>
+              <a:spcPct val="0"/>
+            </a:spcBef>
+            <a:spcAft>
+              <a:spcPct val="35000"/>
+            </a:spcAft>
+          </a:pPr>
+          <a:endParaRPr lang="nl-NL" sz="2000" kern="1200" dirty="0"/>
+        </a:p>
+      </dsp:txBody>
+      <dsp:txXfrm>
+        <a:off x="983325" y="243864"/>
+        <a:ext cx="1450851" cy="1960543"/>
+      </dsp:txXfrm>
+    </dsp:sp>
+    <dsp:sp modelId="{69C763B0-79B3-4C8F-AE21-8321731021B5}">
+      <dsp:nvSpPr>
+        <dsp:cNvPr id="0" name=""/>
+        <dsp:cNvSpPr/>
+      </dsp:nvSpPr>
+      <dsp:spPr>
+        <a:xfrm>
+          <a:off x="2732752" y="417637"/>
+          <a:ext cx="4048234" cy="1627251"/>
+        </a:xfrm>
+        <a:prstGeom prst="chevron">
+          <a:avLst/>
+        </a:prstGeom>
+        <a:solidFill>
+          <a:schemeClr val="accent1">
+            <a:alpha val="90000"/>
+            <a:tint val="40000"/>
+            <a:hueOff val="0"/>
+            <a:satOff val="0"/>
+            <a:lumOff val="0"/>
+            <a:alphaOff val="0"/>
+          </a:schemeClr>
+        </a:solidFill>
+        <a:ln w="25400" cap="flat" cmpd="sng" algn="ctr">
+          <a:solidFill>
+            <a:schemeClr val="accent1">
+              <a:alpha val="90000"/>
+              <a:tint val="40000"/>
+              <a:hueOff val="0"/>
+              <a:satOff val="0"/>
+              <a:lumOff val="0"/>
+              <a:alphaOff val="0"/>
+            </a:schemeClr>
+          </a:solidFill>
+          <a:prstDash val="solid"/>
+        </a:ln>
+        <a:effectLst/>
+      </dsp:spPr>
+      <dsp:style>
+        <a:lnRef idx="2">
+          <a:scrgbClr r="0" g="0" b="0"/>
+        </a:lnRef>
+        <a:fillRef idx="1">
+          <a:scrgbClr r="0" g="0" b="0"/>
+        </a:fillRef>
+        <a:effectRef idx="0">
+          <a:scrgbClr r="0" g="0" b="0"/>
+        </a:effectRef>
+        <a:fontRef idx="minor"/>
+      </dsp:style>
+      <dsp:txBody>
+        <a:bodyPr spcFirstLastPara="0" vert="horz" wrap="square" lIns="25400" tIns="12700" rIns="0" bIns="12700" numCol="1" spcCol="1270" anchor="ctr" anchorCtr="0">
+          <a:noAutofit/>
+        </a:bodyPr>
+        <a:lstStyle/>
+        <a:p>
+          <a:pPr lvl="0" algn="ctr" defTabSz="889000">
+            <a:lnSpc>
+              <a:spcPct val="90000"/>
+            </a:lnSpc>
+            <a:spcBef>
+              <a:spcPct val="0"/>
+            </a:spcBef>
+            <a:spcAft>
+              <a:spcPct val="35000"/>
+            </a:spcAft>
+          </a:pPr>
+          <a:endParaRPr lang="nl-NL" sz="2000" kern="1200" dirty="0" smtClean="0"/>
+        </a:p>
+      </dsp:txBody>
+      <dsp:txXfrm>
+        <a:off x="3546378" y="417637"/>
+        <a:ext cx="2420983" cy="1627251"/>
+      </dsp:txXfrm>
+    </dsp:sp>
   </dsp:spTree>
 </dsp:drawing>
 </file>
@@ -4776,7 +5160,7 @@
             <a:fld id="{5F993C83-2184-4286-ABE1-941A40B40C8F}" type="datetimeFigureOut">
               <a:rPr lang="en-US" smtClean="0"/>
               <a:pPr/>
-              <a:t>5/17/2016</a:t>
+              <a:t>5/23/2016</a:t>
             </a:fld>
             <a:endParaRPr lang="en-US"/>
           </a:p>
@@ -4943,7 +5327,7 @@
             <a:fld id="{6053241F-7ED4-45AC-844C-15DB0D5F9CCD}" type="datetimeFigureOut">
               <a:rPr lang="en-US" smtClean="0"/>
               <a:pPr/>
-              <a:t>5/17/2016</a:t>
+              <a:t>5/23/2016</a:t>
             </a:fld>
             <a:endParaRPr lang="en-US"/>
           </a:p>
@@ -7061,8 +7445,12 @@
           <a:lstStyle/>
           <a:p>
             <a:r>
-              <a:rPr lang="en-US" smtClean="0"/>
-              <a:t>By Author</a:t>
+              <a:rPr lang="en-US" dirty="0" smtClean="0"/>
+              <a:t>By </a:t>
+            </a:r>
+            <a:r>
+              <a:rPr lang="en-US" dirty="0" smtClean="0"/>
+              <a:t>Sanne Marx</a:t>
             </a:r>
             <a:endParaRPr lang="en-US" dirty="0"/>
           </a:p>
@@ -7117,8 +7505,15 @@
           <a:p>
             <a:r>
               <a:rPr lang="nl-NL" dirty="0" smtClean="0"/>
-              <a:t>Step by step Build process</a:t>
-            </a:r>
+              <a:t>arm_cortex_a8_AttributeInfo.xml</a:t>
+            </a:r>
+            <a:r>
+              <a:rPr lang="nl-NL" dirty="0"/>
+              <a:t/>
+            </a:r>
+            <a:br>
+              <a:rPr lang="nl-NL" dirty="0"/>
+            </a:br>
             <a:endParaRPr lang="nl-NL" dirty="0"/>
           </a:p>
         </p:txBody>
@@ -7138,13 +7533,147 @@
           <a:bodyPr/>
           <a:lstStyle/>
           <a:p>
+            <a:pPr lvl="1"/>
+            <a:r>
+              <a:rPr lang="nl-NL" dirty="0"/>
+              <a:t>Purpose</a:t>
+            </a:r>
+            <a:r>
+              <a:rPr lang="nl-NL" dirty="0" smtClean="0"/>
+              <a:t>:</a:t>
+            </a:r>
+          </a:p>
+          <a:p>
+            <a:pPr lvl="2"/>
+            <a:r>
+              <a:rPr lang="nl-NL" dirty="0" smtClean="0"/>
+              <a:t>Set the AR Drone specific code generation flags</a:t>
+            </a:r>
+          </a:p>
+          <a:p>
+            <a:pPr lvl="2"/>
+            <a:r>
+              <a:rPr lang="nl-NL" dirty="0" smtClean="0"/>
+              <a:t>Enbale the Drone to communicate via External Mode with Simulink</a:t>
+            </a:r>
+          </a:p>
+          <a:p>
+            <a:pPr lvl="1"/>
+            <a:r>
+              <a:rPr lang="nl-NL" dirty="0" smtClean="0"/>
+              <a:t>Invoked </a:t>
+            </a:r>
+            <a:r>
+              <a:rPr lang="nl-NL" dirty="0"/>
+              <a:t>by:</a:t>
+            </a:r>
+          </a:p>
+          <a:p>
+            <a:pPr lvl="2"/>
+            <a:r>
+              <a:rPr lang="nl-NL" dirty="0" smtClean="0"/>
+              <a:t>AR_Drone_2_thread.xml</a:t>
+            </a:r>
+            <a:endParaRPr lang="nl-NL" dirty="0"/>
+          </a:p>
+          <a:p>
+            <a:pPr lvl="1"/>
+            <a:r>
+              <a:rPr lang="nl-NL" dirty="0" smtClean="0"/>
+              <a:t>Contains:</a:t>
+            </a:r>
+          </a:p>
+          <a:p>
+            <a:pPr lvl="2"/>
+            <a:r>
+              <a:rPr lang="nl-NL" dirty="0" smtClean="0"/>
+              <a:t>ARM specific compiler, assembler and linker flags</a:t>
+            </a:r>
+          </a:p>
+          <a:p>
+            <a:pPr lvl="2"/>
+            <a:r>
+              <a:rPr lang="nl-NL" dirty="0" smtClean="0"/>
+              <a:t>Location of the External Mode rtiostream files (tcpip)</a:t>
+            </a:r>
+          </a:p>
+        </p:txBody>
+      </p:sp>
+    </p:spTree>
+    <p:extLst>
+      <p:ext uri="{BB962C8B-B14F-4D97-AF65-F5344CB8AC3E}">
+        <p14:creationId xmlns:p14="http://schemas.microsoft.com/office/powerpoint/2010/main" val="2297659202"/>
+      </p:ext>
+    </p:extLst>
+  </p:cSld>
+  <p:clrMapOvr>
+    <a:masterClrMapping/>
+  </p:clrMapOvr>
+</p:sld>
+</file>
+
+<file path=ppt/slides/slide11.xml><?xml version="1.0" encoding="utf-8"?>
+<p:sld xmlns:a="http://schemas.openxmlformats.org/drawingml/2006/main" xmlns:r="http://schemas.openxmlformats.org/officeDocument/2006/relationships" xmlns:p="http://schemas.openxmlformats.org/presentationml/2006/main">
+  <p:cSld>
+    <p:spTree>
+      <p:nvGrpSpPr>
+        <p:cNvPr id="1" name=""/>
+        <p:cNvGrpSpPr/>
+        <p:nvPr/>
+      </p:nvGrpSpPr>
+      <p:grpSpPr>
+        <a:xfrm>
+          <a:off x="0" y="0"/>
+          <a:ext cx="0" cy="0"/>
+          <a:chOff x="0" y="0"/>
+          <a:chExt cx="0" cy="0"/>
+        </a:xfrm>
+      </p:grpSpPr>
+      <p:sp>
+        <p:nvSpPr>
+          <p:cNvPr id="2" name="Title 1"/>
+          <p:cNvSpPr>
+            <a:spLocks noGrp="1"/>
+          </p:cNvSpPr>
+          <p:nvPr>
+            <p:ph type="title"/>
+          </p:nvPr>
+        </p:nvSpPr>
+        <p:spPr/>
+        <p:txBody>
+          <a:bodyPr/>
+          <a:lstStyle/>
+          <a:p>
+            <a:r>
+              <a:rPr lang="nl-NL" dirty="0" smtClean="0"/>
+              <a:t>Step by step Build process</a:t>
+            </a:r>
+            <a:endParaRPr lang="nl-NL" dirty="0"/>
+          </a:p>
+        </p:txBody>
+      </p:sp>
+      <p:sp>
+        <p:nvSpPr>
+          <p:cNvPr id="3" name="Content Placeholder 2"/>
+          <p:cNvSpPr>
+            <a:spLocks noGrp="1"/>
+          </p:cNvSpPr>
+          <p:nvPr>
+            <p:ph idx="1"/>
+          </p:nvPr>
+        </p:nvSpPr>
+        <p:spPr/>
+        <p:txBody>
+          <a:bodyPr/>
+          <a:lstStyle/>
+          <a:p>
             <a:pPr marL="457200" indent="-457200">
               <a:buFont typeface="+mj-lt"/>
               <a:buAutoNum type="arabicPeriod"/>
             </a:pPr>
             <a:r>
-              <a:rPr lang="nl-NL" dirty="0" smtClean="0"/>
-              <a:t>Build is pressed</a:t>
+              <a:rPr lang="nl-NL" sz="800" dirty="0" smtClean="0"/>
+              <a:t>User pressed Build </a:t>
             </a:r>
           </a:p>
           <a:p>
@@ -7153,8 +7682,16 @@
               <a:buAutoNum type="arabicPeriod"/>
             </a:pPr>
             <a:r>
-              <a:rPr lang="nl-NL" dirty="0" smtClean="0"/>
-              <a:t>Retrieve the ToolchainInforRegistry parameters</a:t>
+              <a:rPr lang="nl-NL" sz="800" dirty="0" smtClean="0"/>
+              <a:t>Compile the block diagram to “</a:t>
+            </a:r>
+            <a:r>
+              <a:rPr lang="nl-NL" sz="800" u="sng" dirty="0" smtClean="0"/>
+              <a:t>model.rtw</a:t>
+            </a:r>
+            <a:r>
+              <a:rPr lang="nl-NL" sz="800" dirty="0" smtClean="0"/>
+              <a:t>”</a:t>
             </a:r>
           </a:p>
           <a:p>
@@ -7163,8 +7700,79 @@
               <a:buAutoNum type="arabicPeriod"/>
             </a:pPr>
             <a:r>
-              <a:rPr lang="nl-NL" dirty="0" smtClean="0"/>
-              <a:t>If none are present run rtwTargetInfo to load the </a:t>
+              <a:rPr lang="en-US" sz="800" dirty="0"/>
+              <a:t>Evaluates simulation and block </a:t>
+            </a:r>
+            <a:r>
+              <a:rPr lang="en-US" sz="800" dirty="0" smtClean="0"/>
+              <a:t>parameters</a:t>
+            </a:r>
+          </a:p>
+          <a:p>
+            <a:pPr marL="858247" lvl="1" indent="-457200">
+              <a:buFont typeface="+mj-lt"/>
+              <a:buAutoNum type="arabicPeriod"/>
+            </a:pPr>
+            <a:r>
+              <a:rPr lang="en-US" sz="800" dirty="0" smtClean="0"/>
+              <a:t>Propagates signal widths and sample times</a:t>
+            </a:r>
+          </a:p>
+          <a:p>
+            <a:pPr marL="858247" lvl="1" indent="-457200">
+              <a:buFont typeface="+mj-lt"/>
+              <a:buAutoNum type="arabicPeriod"/>
+            </a:pPr>
+            <a:r>
+              <a:rPr lang="en-US" sz="800" dirty="0" smtClean="0"/>
+              <a:t>Determines the execution order of blocks within the model</a:t>
+            </a:r>
+          </a:p>
+          <a:p>
+            <a:pPr marL="858247" lvl="1" indent="-457200">
+              <a:buFont typeface="+mj-lt"/>
+              <a:buAutoNum type="arabicPeriod"/>
+            </a:pPr>
+            <a:r>
+              <a:rPr lang="en-US" sz="800" dirty="0" smtClean="0"/>
+              <a:t>Computes work vector sizes, such as those used by S-functions.</a:t>
+            </a:r>
+            <a:endParaRPr lang="nl-NL" sz="800" dirty="0" smtClean="0"/>
+          </a:p>
+          <a:p>
+            <a:pPr marL="457200" indent="-457200">
+              <a:buFont typeface="+mj-lt"/>
+              <a:buAutoNum type="arabicPeriod"/>
+            </a:pPr>
+            <a:r>
+              <a:rPr lang="nl-NL" sz="800" dirty="0" smtClean="0"/>
+              <a:t>Retrieve the ToolchainInforRegistry parameters</a:t>
+            </a:r>
+          </a:p>
+          <a:p>
+            <a:pPr marL="858247" lvl="1" indent="-457200">
+              <a:buFont typeface="+mj-lt"/>
+              <a:buAutoNum type="arabicPeriod"/>
+            </a:pPr>
+            <a:r>
+              <a:rPr lang="nl-NL" sz="800" dirty="0" smtClean="0"/>
+              <a:t>If none are present </a:t>
+            </a:r>
+            <a:r>
+              <a:rPr lang="nl-NL" sz="800" u="sng" dirty="0" smtClean="0"/>
+              <a:t>rtwTargetInfo.m</a:t>
+            </a:r>
+            <a:r>
+              <a:rPr lang="nl-NL" sz="800" dirty="0" smtClean="0"/>
+              <a:t> is ran to load the </a:t>
+            </a:r>
+            <a:r>
+              <a:rPr lang="nl-NL" sz="800" u="sng" dirty="0" smtClean="0"/>
+              <a:t>gcc_codesourcery_arm_linux_gnueabihf_gmake_win64_v4_8.mat</a:t>
+            </a:r>
+            <a:r>
+              <a:rPr lang="nl-NL" sz="800" dirty="0" smtClean="0"/>
+              <a:t> file containing the parameters</a:t>
             </a:r>
           </a:p>
           <a:p>
@@ -7173,16 +7781,74 @@
               <a:buAutoNum type="arabicPeriod"/>
             </a:pPr>
             <a:r>
-              <a:rPr lang="nl-NL" dirty="0" smtClean="0"/>
-              <a:t>Load </a:t>
-            </a:r>
-            <a:r>
-              <a:rPr lang="nl-NL" dirty="0"/>
-              <a:t>from </a:t>
-            </a:r>
-            <a:r>
-              <a:rPr lang="nl-NL" dirty="0" smtClean="0"/>
+              <a:rPr lang="nl-NL" sz="800" dirty="0" smtClean="0"/>
+              <a:t>Manually running </a:t>
+            </a:r>
+            <a:r>
+              <a:rPr lang="nl-NL" sz="800" u="sng" dirty="0" smtClean="0"/>
+              <a:t>generateTargetInfoMatFile.m</a:t>
+            </a:r>
+            <a:r>
+              <a:rPr lang="nl-NL" sz="800" dirty="0" smtClean="0"/>
+              <a:t> creates </a:t>
+            </a:r>
+            <a:r>
+              <a:rPr lang="nl-NL" sz="800" u="sng" dirty="0" smtClean="0"/>
               <a:t>gcc_codesourcery_arm_linux_gnueabihf_gmake_win64_v4_8.mat</a:t>
+            </a:r>
+            <a:r>
+              <a:rPr lang="nl-NL" sz="800" dirty="0" smtClean="0"/>
+              <a:t> by running  </a:t>
+            </a:r>
+            <a:r>
+              <a:rPr lang="nl-NL" sz="800" u="sng" dirty="0" smtClean="0"/>
+              <a:t>gcc_codesourcery_arm_linux_gnueabihf.m</a:t>
+            </a:r>
+            <a:r>
+              <a:rPr lang="nl-NL" sz="800" dirty="0" smtClean="0"/>
+              <a:t> which contains the parameters describing the build, compile and linking process.</a:t>
+            </a:r>
+          </a:p>
+          <a:p>
+            <a:pPr marL="457200" indent="-457200">
+              <a:buFont typeface="+mj-lt"/>
+              <a:buAutoNum type="arabicPeriod"/>
+            </a:pPr>
+            <a:r>
+              <a:rPr lang="nl-NL" sz="800" dirty="0" smtClean="0"/>
+              <a:t>Start the TLC compilation process using the ToolchainInfoRegistry params</a:t>
+            </a:r>
+          </a:p>
+          <a:p>
+            <a:pPr marL="858247" lvl="1" indent="-457200">
+              <a:buFont typeface="+mj-lt"/>
+              <a:buAutoNum type="arabicPeriod"/>
+            </a:pPr>
+            <a:r>
+              <a:rPr lang="nl-NL" sz="800" dirty="0" smtClean="0"/>
+              <a:t>Using the Code Sourcery assembler, C compiler, linker and archiver, “</a:t>
+            </a:r>
+            <a:r>
+              <a:rPr lang="nl-NL" sz="800" u="sng" dirty="0" smtClean="0"/>
+              <a:t>model.elf</a:t>
+            </a:r>
+            <a:r>
+              <a:rPr lang="nl-NL" sz="800" dirty="0" smtClean="0"/>
+              <a:t>” is created</a:t>
+            </a:r>
+          </a:p>
+          <a:p>
+            <a:pPr marL="858247" lvl="1" indent="-457200">
+              <a:buFont typeface="+mj-lt"/>
+              <a:buAutoNum type="arabicPeriod"/>
+            </a:pPr>
+            <a:r>
+              <a:rPr lang="nl-NL" sz="800" dirty="0" smtClean="0"/>
+              <a:t>Include the external mode AR Drone target source files defined in </a:t>
+            </a:r>
+            <a:r>
+              <a:rPr lang="nl-NL" sz="800" u="sng" dirty="0" smtClean="0"/>
+              <a:t>arm_cortex_a8_AttributeInfo_linux_thread.xml</a:t>
             </a:r>
           </a:p>
           <a:p>
@@ -7191,23 +7857,253 @@
               <a:buAutoNum type="arabicPeriod"/>
             </a:pPr>
             <a:r>
-              <a:rPr lang="nl-NL" dirty="0" smtClean="0"/>
-              <a:t>Mat file can be manually generated using generateTargetInfoMatFile.m</a:t>
-            </a:r>
-          </a:p>
-          <a:p>
-            <a:pPr marL="1717635" lvl="3" indent="-457200">
+              <a:rPr lang="nl-NL" sz="800" u="sng" dirty="0" smtClean="0"/>
+              <a:t>AR_drone_ext_work.c </a:t>
+            </a:r>
+            <a:r>
+              <a:rPr lang="nl-NL" sz="800" dirty="0" smtClean="0"/>
+              <a:t>defining the different external mode states of the drone (paused, waiting for start, terminate)</a:t>
+            </a:r>
+          </a:p>
+          <a:p>
+            <a:pPr marL="1259295" lvl="2" indent="-457200">
               <a:buFont typeface="+mj-lt"/>
               <a:buAutoNum type="arabicPeriod"/>
             </a:pPr>
             <a:r>
-              <a:rPr lang="nl-NL" dirty="0"/>
-              <a:t>Calls </a:t>
-            </a:r>
-            <a:r>
-              <a:rPr lang="nl-NL" dirty="0" smtClean="0"/>
-              <a:t>gcc_codesourcery_arm_linux_gnueabihf.m which contains the parameters describing the build, compile and linking process.</a:t>
-            </a:r>
+              <a:rPr lang="nl-NL" sz="800" u="sng" dirty="0"/>
+              <a:t>AR_Drone_ext_svr.c </a:t>
+            </a:r>
+            <a:r>
+              <a:rPr lang="nl-NL" sz="800" dirty="0"/>
+              <a:t>defines the tcpip data </a:t>
+            </a:r>
+            <a:r>
+              <a:rPr lang="nl-NL" sz="800" dirty="0" smtClean="0"/>
+              <a:t>transfer functions</a:t>
+            </a:r>
+          </a:p>
+          <a:p>
+            <a:pPr marL="858247" lvl="1" indent="-457200">
+              <a:buFont typeface="+mj-lt"/>
+              <a:buAutoNum type="arabicPeriod"/>
+            </a:pPr>
+            <a:r>
+              <a:rPr lang="nl-NL" sz="800" dirty="0" smtClean="0">
+                <a:solidFill>
+                  <a:srgbClr val="FF0000"/>
+                </a:solidFill>
+              </a:rPr>
+              <a:t>Include the </a:t>
+            </a:r>
+            <a:r>
+              <a:rPr lang="nl-NL" sz="800" dirty="0" smtClean="0">
+                <a:solidFill>
+                  <a:srgbClr val="FF0000"/>
+                </a:solidFill>
+              </a:rPr>
+              <a:t>scheduler source which is automatically located using the XML in the fixed folder structure /registry/schedulers/AR_Drone_scheduler.XML</a:t>
+            </a:r>
+            <a:endParaRPr lang="nl-NL" sz="800" dirty="0" smtClean="0">
+              <a:solidFill>
+                <a:srgbClr val="FF0000"/>
+              </a:solidFill>
+            </a:endParaRPr>
+          </a:p>
+          <a:p>
+            <a:pPr marL="457200" indent="-457200">
+              <a:buFont typeface="+mj-lt"/>
+              <a:buAutoNum type="arabicPeriod"/>
+            </a:pPr>
+            <a:r>
+              <a:rPr lang="nl-NL" sz="800" dirty="0" smtClean="0">
+                <a:solidFill>
+                  <a:srgbClr val="FF0000"/>
+                </a:solidFill>
+              </a:rPr>
+              <a:t>Call the onAfterCodeGen hook</a:t>
+            </a:r>
+          </a:p>
+          <a:p>
+            <a:pPr marL="858247" lvl="1" indent="-457200">
+              <a:buFont typeface="+mj-lt"/>
+              <a:buAutoNum type="arabicPeriod"/>
+            </a:pPr>
+            <a:r>
+              <a:rPr lang="nl-NL" sz="800" dirty="0" smtClean="0">
+                <a:solidFill>
+                  <a:srgbClr val="FF0000"/>
+                </a:solidFill>
+              </a:rPr>
+              <a:t>Include target specific linuxUDP.c, linuxinitialise.c and link to the ldl library </a:t>
+            </a:r>
+          </a:p>
+          <a:p>
+            <a:pPr marL="457200" indent="-457200">
+              <a:buFont typeface="+mj-lt"/>
+              <a:buAutoNum type="arabicPeriod"/>
+            </a:pPr>
+            <a:r>
+              <a:rPr lang="nl-NL" sz="800" dirty="0" smtClean="0">
+                <a:solidFill>
+                  <a:srgbClr val="FF0000"/>
+                </a:solidFill>
+              </a:rPr>
+              <a:t>Call </a:t>
+            </a:r>
+            <a:r>
+              <a:rPr lang="nl-NL" sz="800" dirty="0" smtClean="0">
+                <a:solidFill>
+                  <a:srgbClr val="FF0000"/>
+                </a:solidFill>
+              </a:rPr>
+              <a:t>codertarget.postCodeGenHookCommand(h) from the PostCodeGenCommand parameter</a:t>
+            </a:r>
+          </a:p>
+          <a:p>
+            <a:pPr marL="457200" indent="-457200">
+              <a:buFont typeface="+mj-lt"/>
+              <a:buAutoNum type="arabicPeriod"/>
+            </a:pPr>
+            <a:r>
+              <a:rPr lang="nl-NL" sz="800" dirty="0" smtClean="0">
+                <a:solidFill>
+                  <a:srgbClr val="FF0000"/>
+                </a:solidFill>
+              </a:rPr>
+              <a:t>MAKE?</a:t>
+            </a:r>
+          </a:p>
+          <a:p>
+            <a:pPr marL="457200" indent="-457200">
+              <a:buFont typeface="+mj-lt"/>
+              <a:buAutoNum type="arabicPeriod"/>
+            </a:pPr>
+            <a:r>
+              <a:rPr lang="nl-NL" sz="800" dirty="0" smtClean="0"/>
+              <a:t>Call the download tool</a:t>
+            </a:r>
+          </a:p>
+          <a:p>
+            <a:pPr marL="858247" lvl="1" indent="-457200">
+              <a:buFont typeface="+mj-lt"/>
+              <a:buAutoNum type="arabicPeriod"/>
+            </a:pPr>
+            <a:r>
+              <a:rPr lang="nl-NL" sz="800" u="sng" dirty="0" smtClean="0"/>
+              <a:t>SSHDownload.m</a:t>
+            </a:r>
+            <a:r>
+              <a:rPr lang="nl-NL" sz="800" dirty="0" smtClean="0"/>
+              <a:t> as specified in </a:t>
+            </a:r>
+            <a:r>
+              <a:rPr lang="nl-NL" sz="800" u="sng" dirty="0" smtClean="0"/>
+              <a:t>AR_Drone_2_thread.xml</a:t>
+            </a:r>
+            <a:endParaRPr lang="nl-NL" sz="404" u="sng" dirty="0" smtClean="0"/>
+          </a:p>
+          <a:p>
+            <a:pPr marL="1259295" lvl="2" indent="-457200">
+              <a:buFont typeface="+mj-lt"/>
+              <a:buAutoNum type="arabicPeriod"/>
+            </a:pPr>
+            <a:r>
+              <a:rPr lang="nl-NL" sz="800" dirty="0" smtClean="0"/>
+              <a:t>Retrieve the IP set in “Configuration Parameters &gt;&gt; Hardware board settings &gt;&gt; Target Hardware Resources” which is a parameter defined in “/registry/parameters/arm_cortex_a8_ParameterInfo.xml”</a:t>
+            </a:r>
+          </a:p>
+          <a:p>
+            <a:pPr marL="1259295" lvl="2" indent="-457200">
+              <a:buFont typeface="+mj-lt"/>
+              <a:buAutoNum type="arabicPeriod"/>
+            </a:pPr>
+            <a:r>
+              <a:rPr lang="nl-NL" sz="800" dirty="0" smtClean="0"/>
+              <a:t>Use </a:t>
+            </a:r>
+            <a:r>
+              <a:rPr lang="nl-NL" sz="800" dirty="0" smtClean="0"/>
+              <a:t>MATLAB built in FTP to transfer “</a:t>
+            </a:r>
+            <a:r>
+              <a:rPr lang="nl-NL" sz="800" u="sng" dirty="0" smtClean="0"/>
+              <a:t>model.efl</a:t>
+            </a:r>
+            <a:r>
+              <a:rPr lang="nl-NL" sz="800" dirty="0" smtClean="0"/>
+              <a:t>” to the drone</a:t>
+            </a:r>
+          </a:p>
+          <a:p>
+            <a:pPr marL="1259295" lvl="2" indent="-457200">
+              <a:buFont typeface="+mj-lt"/>
+              <a:buAutoNum type="arabicPeriod"/>
+            </a:pPr>
+            <a:r>
+              <a:rPr lang="nl-NL" sz="800" dirty="0" smtClean="0"/>
+              <a:t>Use MATLAB built in tcpip to kill unwanted programs, chmod the new model, and execute it ready for external mode (./</a:t>
+            </a:r>
+            <a:r>
+              <a:rPr lang="nl-NL" sz="800" u="sng" dirty="0" smtClean="0"/>
+              <a:t>model.elf</a:t>
+            </a:r>
+            <a:r>
+              <a:rPr lang="nl-NL" sz="800" dirty="0" smtClean="0"/>
+              <a:t>  -w)</a:t>
+            </a:r>
+          </a:p>
+          <a:p>
+            <a:pPr marL="457200" indent="-457200">
+              <a:buFont typeface="+mj-lt"/>
+              <a:buAutoNum type="arabicPeriod"/>
+            </a:pPr>
+            <a:r>
+              <a:rPr lang="nl-NL" sz="800" dirty="0" smtClean="0"/>
+              <a:t>User presses connect to target</a:t>
+            </a:r>
+          </a:p>
+          <a:p>
+            <a:pPr marL="858247" lvl="1" indent="-457200">
+              <a:buFont typeface="+mj-lt"/>
+              <a:buAutoNum type="arabicPeriod"/>
+            </a:pPr>
+            <a:r>
+              <a:rPr lang="nl-NL" sz="800" dirty="0" smtClean="0"/>
+              <a:t>External mode sends parameters to target using tcpip</a:t>
+            </a:r>
+          </a:p>
+          <a:p>
+            <a:pPr marL="1259295" lvl="2" indent="-457200">
+              <a:buFont typeface="+mj-lt"/>
+              <a:buAutoNum type="arabicPeriod"/>
+            </a:pPr>
+            <a:r>
+              <a:rPr lang="nl-NL" sz="800" dirty="0" smtClean="0"/>
+              <a:t>External mode IP is passed via </a:t>
+            </a:r>
+            <a:r>
+              <a:rPr lang="nl-NL" sz="800" dirty="0" smtClean="0"/>
+              <a:t>extModeParams.m which retrieves the IP set in the </a:t>
+            </a:r>
+            <a:endParaRPr lang="nl-NL" sz="800" dirty="0" smtClean="0"/>
+          </a:p>
+          <a:p>
+            <a:pPr marL="457200" indent="-457200">
+              <a:buFont typeface="+mj-lt"/>
+              <a:buAutoNum type="arabicPeriod"/>
+            </a:pPr>
+            <a:r>
+              <a:rPr lang="nl-NL" sz="800" dirty="0" smtClean="0"/>
+              <a:t>User presses run</a:t>
+            </a:r>
+          </a:p>
+          <a:p>
+            <a:pPr marL="858247" lvl="1" indent="-457200">
+              <a:buFont typeface="+mj-lt"/>
+              <a:buAutoNum type="arabicPeriod"/>
+            </a:pPr>
+            <a:endParaRPr lang="nl-NL" sz="800" dirty="0" smtClean="0"/>
           </a:p>
         </p:txBody>
       </p:sp>
@@ -7221,6 +8117,13 @@
   <p:clrMapOvr>
     <a:masterClrMapping/>
   </p:clrMapOvr>
+  <p:timing>
+    <p:tnLst>
+      <p:par>
+        <p:cTn id="1" dur="indefinite" restart="never" nodeType="tmRoot"/>
+      </p:par>
+    </p:tnLst>
+  </p:timing>
 </p:sld>
 </file>
 
@@ -10142,7 +11045,6 @@
               <a:rPr lang="nl-NL" dirty="0" smtClean="0"/>
               <a:t>gcc_codesourcery_arm_linux_gnueabihf parameters for the build process</a:t>
             </a:r>
-            <a:endParaRPr lang="nl-NL" dirty="0" smtClean="0"/>
           </a:p>
           <a:p>
             <a:pPr lvl="1"/>
@@ -10176,7 +11078,6 @@
               <a:rPr lang="nl-NL" dirty="0"/>
               <a:t>“RTW.TargetRegistry.getInstance('reset')”</a:t>
             </a:r>
-            <a:endParaRPr lang="nl-NL" dirty="0"/>
           </a:p>
           <a:p>
             <a:pPr lvl="1"/>
@@ -10333,11 +11234,7 @@
             <a:pPr lvl="2"/>
             <a:r>
               <a:rPr lang="nl-NL" dirty="0" smtClean="0"/>
-              <a:t>sl_refresh_customizations </a:t>
-            </a:r>
-            <a:r>
-              <a:rPr lang="nl-NL" dirty="0" smtClean="0"/>
-              <a:t>(called on first Simulink Model openening and AR_Drone_Startup.m)</a:t>
+              <a:t>sl_refresh_customizations (called on first Simulink Model openening and AR_Drone_Startup.m)</a:t>
             </a:r>
           </a:p>
           <a:p>
@@ -10357,11 +11254,6 @@
               </a:rPr>
               <a:t>?????????????</a:t>
             </a:r>
-            <a:endParaRPr lang="nl-NL" dirty="0" smtClean="0">
-              <a:solidFill>
-                <a:srgbClr val="FF0000"/>
-              </a:solidFill>
-            </a:endParaRPr>
           </a:p>
           <a:p>
             <a:pPr lvl="1"/>
@@ -10433,7 +11325,7 @@
           <a:p>
             <a:r>
               <a:rPr lang="nl-NL" dirty="0" smtClean="0"/>
-              <a:t>AR_Drone_2_thead.xml</a:t>
+              <a:t>gcc_codesourcery_arm_linux_gnueabihf.m</a:t>
             </a:r>
             <a:endParaRPr lang="nl-NL" dirty="0"/>
           </a:p>
@@ -10456,22 +11348,19 @@
           <a:p>
             <a:pPr lvl="1"/>
             <a:r>
+              <a:rPr lang="nl-NL" dirty="0"/>
+              <a:t>Purpose</a:t>
+            </a:r>
+            <a:r>
               <a:rPr lang="nl-NL" dirty="0" smtClean="0"/>
-              <a:t>Purpose:</a:t>
+              <a:t>:</a:t>
             </a:r>
           </a:p>
           <a:p>
             <a:pPr lvl="2"/>
             <a:r>
               <a:rPr lang="nl-NL" dirty="0" smtClean="0"/>
-              <a:t>Create custom user options required for the “Build, load and run” process</a:t>
-            </a:r>
-          </a:p>
-          <a:p>
-            <a:pPr lvl="2"/>
-            <a:r>
-              <a:rPr lang="nl-NL" dirty="0" smtClean="0"/>
-              <a:t>Specify target specific flags and external mode files</a:t>
+              <a:t>Generate a mat file which defines the build options</a:t>
             </a:r>
           </a:p>
           <a:p>
@@ -10481,45 +11370,42 @@
               <a:t>Invoked </a:t>
             </a:r>
             <a:r>
-              <a:rPr lang="nl-NL" smtClean="0"/>
-              <a:t>by:</a:t>
+              <a:rPr lang="nl-NL" dirty="0"/>
+              <a:t>by</a:t>
+            </a:r>
+            <a:r>
+              <a:rPr lang="nl-NL" dirty="0" smtClean="0"/>
+              <a:t>:</a:t>
             </a:r>
           </a:p>
           <a:p>
             <a:pPr lvl="2"/>
             <a:r>
-              <a:rPr lang="nl-NL" smtClean="0"/>
-              <a:t>sl_customization.m</a:t>
-            </a:r>
-            <a:endParaRPr lang="nl-NL" dirty="0" smtClean="0"/>
+              <a:rPr lang="nl-NL" dirty="0" smtClean="0"/>
+              <a:t>generateTargetInfoMatFile.m</a:t>
+            </a:r>
+            <a:endParaRPr lang="nl-NL" dirty="0"/>
           </a:p>
           <a:p>
             <a:pPr lvl="1"/>
             <a:r>
-              <a:rPr lang="nl-NL" smtClean="0"/>
+              <a:rPr lang="nl-NL" dirty="0" smtClean="0"/>
               <a:t>Appears </a:t>
             </a:r>
             <a:r>
+              <a:rPr lang="nl-NL" dirty="0"/>
+              <a:t>to the user as</a:t>
+            </a:r>
+            <a:r>
               <a:rPr lang="nl-NL" dirty="0" smtClean="0"/>
-              <a:t>to the user as:</a:t>
+              <a:t>:</a:t>
             </a:r>
           </a:p>
           <a:p>
             <a:pPr lvl="2"/>
             <a:r>
               <a:rPr lang="nl-NL" dirty="0" smtClean="0"/>
-              <a:t>Configuration parameters &gt; Hardware Implementation &gt; Hardware Board</a:t>
-            </a:r>
-          </a:p>
-          <a:p>
-            <a:pPr lvl="2"/>
-            <a:r>
-              <a:rPr lang="nl-NL" dirty="0"/>
-              <a:t>Configuration </a:t>
-            </a:r>
-            <a:r>
-              <a:rPr lang="nl-NL" dirty="0" smtClean="0"/>
-              <a:t>parameters &gt; Code Generation &gt; Toolchain</a:t>
+              <a:t>Configuration Parameters &gt;&gt; Code Generation &gt;&gt; Toolchain Settings </a:t>
             </a:r>
           </a:p>
           <a:p>
@@ -10533,44 +11419,32 @@
             <a:pPr lvl="2"/>
             <a:r>
               <a:rPr lang="nl-NL" dirty="0" smtClean="0"/>
-              <a:t>User description for the Hardware Board UI and Toolchain name</a:t>
+              <a:t>The </a:t>
+            </a:r>
+            <a:r>
+              <a:rPr lang="nl-NL" dirty="0"/>
+              <a:t>used assembler, compiler, linker and archiver (code </a:t>
+            </a:r>
+            <a:r>
+              <a:rPr lang="nl-NL" dirty="0" smtClean="0"/>
+              <a:t>sourcery)</a:t>
             </a:r>
           </a:p>
           <a:p>
             <a:pPr lvl="2"/>
             <a:r>
               <a:rPr lang="nl-NL" dirty="0" smtClean="0"/>
-              <a:t>Commands passed to the ssh_download.bat script </a:t>
-            </a:r>
-          </a:p>
-          <a:p>
-            <a:pPr lvl="2"/>
-            <a:r>
-              <a:rPr lang="nl-NL" dirty="0" smtClean="0"/>
-              <a:t>Location of the MATLAB linux codertarget XML file</a:t>
-            </a:r>
-          </a:p>
-          <a:p>
-            <a:pPr lvl="1"/>
-            <a:r>
-              <a:rPr lang="nl-NL" dirty="0" smtClean="0"/>
-              <a:t>Custom file pointers:</a:t>
-            </a:r>
-            <a:endParaRPr lang="nl-NL" u="sng" dirty="0" smtClean="0"/>
-          </a:p>
-          <a:p>
-            <a:pPr lvl="2"/>
-            <a:r>
-              <a:rPr lang="nl-NL" dirty="0" smtClean="0"/>
-              <a:t>arm_cortex_a8_ParameterInfo.xml</a:t>
-            </a:r>
-          </a:p>
-          <a:p>
-            <a:pPr lvl="2"/>
-            <a:r>
-              <a:rPr lang="nl-NL" dirty="0" smtClean="0"/>
-              <a:t>arm_cortex_a8_AttributeInfo.xml</a:t>
-            </a:r>
+              <a:t>The </a:t>
+            </a:r>
+            <a:r>
+              <a:rPr lang="nl-NL" dirty="0"/>
+              <a:t>options for the different build options (Faster Builds, Faster Runs, Debug)</a:t>
+            </a:r>
+          </a:p>
+          <a:p>
+            <a:pPr marL="0" indent="0">
+              <a:buNone/>
+            </a:pPr>
             <a:endParaRPr lang="nl-NL" dirty="0"/>
           </a:p>
         </p:txBody>
@@ -10578,7 +11452,7 @@
     </p:spTree>
     <p:extLst>
       <p:ext uri="{BB962C8B-B14F-4D97-AF65-F5344CB8AC3E}">
-        <p14:creationId xmlns:p14="http://schemas.microsoft.com/office/powerpoint/2010/main" val="3092856080"/>
+        <p14:creationId xmlns:p14="http://schemas.microsoft.com/office/powerpoint/2010/main" val="2213302648"/>
       </p:ext>
     </p:extLst>
   </p:cSld>
@@ -10621,12 +11495,9 @@
           <a:lstStyle/>
           <a:p>
             <a:r>
-              <a:rPr lang="nl-NL" dirty="0"/>
-              <a:t>arm_cortex_a8_ParameterInfo.xml</a:t>
-            </a:r>
-            <a:br>
-              <a:rPr lang="nl-NL" dirty="0"/>
-            </a:br>
+              <a:rPr lang="nl-NL" dirty="0" smtClean="0"/>
+              <a:t>AR_Drone_2_thead.xml</a:t>
+            </a:r>
             <a:endParaRPr lang="nl-NL" dirty="0"/>
           </a:p>
         </p:txBody>
@@ -10648,62 +11519,62 @@
           <a:p>
             <a:pPr lvl="1"/>
             <a:r>
+              <a:rPr lang="nl-NL" dirty="0" smtClean="0"/>
+              <a:t>Purpose:</a:t>
+            </a:r>
+          </a:p>
+          <a:p>
+            <a:pPr lvl="2"/>
+            <a:r>
+              <a:rPr lang="nl-NL" dirty="0" smtClean="0"/>
+              <a:t>Create custom user options required for the “Build, load and run” process</a:t>
+            </a:r>
+          </a:p>
+          <a:p>
+            <a:pPr lvl="2"/>
+            <a:r>
+              <a:rPr lang="nl-NL" dirty="0" smtClean="0"/>
+              <a:t>Specify target specific flags and external mode files</a:t>
+            </a:r>
+          </a:p>
+          <a:p>
+            <a:pPr lvl="1"/>
+            <a:r>
+              <a:rPr lang="nl-NL" dirty="0" smtClean="0"/>
+              <a:t>Invoked by:</a:t>
+            </a:r>
+          </a:p>
+          <a:p>
+            <a:pPr lvl="2"/>
+            <a:r>
+              <a:rPr lang="nl-NL" dirty="0" smtClean="0"/>
+              <a:t>sl_customization.m</a:t>
+            </a:r>
+          </a:p>
+          <a:p>
+            <a:pPr lvl="1"/>
+            <a:r>
+              <a:rPr lang="nl-NL" dirty="0" smtClean="0"/>
+              <a:t>Appears to the user as:</a:t>
+            </a:r>
+          </a:p>
+          <a:p>
+            <a:pPr lvl="2"/>
+            <a:r>
+              <a:rPr lang="nl-NL" dirty="0" smtClean="0"/>
+              <a:t>Configuration parameters &gt; Hardware Implementation &gt; Hardware Board</a:t>
+            </a:r>
+          </a:p>
+          <a:p>
+            <a:pPr lvl="2"/>
+            <a:r>
               <a:rPr lang="nl-NL" dirty="0"/>
-              <a:t>Purpose</a:t>
+              <a:t>Configuration </a:t>
             </a:r>
             <a:r>
               <a:rPr lang="nl-NL" dirty="0" smtClean="0"/>
-              <a:t>:</a:t>
-            </a:r>
-          </a:p>
-          <a:p>
-            <a:pPr lvl="2"/>
-            <a:r>
-              <a:rPr lang="nl-NL" dirty="0" smtClean="0"/>
-              <a:t>Provide custom UI options to the user in the configuration parameters</a:t>
-            </a:r>
-          </a:p>
-          <a:p>
-            <a:pPr lvl="1"/>
-            <a:r>
-              <a:rPr lang="nl-NL" dirty="0" smtClean="0"/>
-              <a:t>Invoked </a:t>
-            </a:r>
-            <a:r>
-              <a:rPr lang="nl-NL" dirty="0"/>
-              <a:t>by:</a:t>
-            </a:r>
-          </a:p>
-          <a:p>
-            <a:pPr lvl="2"/>
-            <a:r>
-              <a:rPr lang="nl-NL" dirty="0" smtClean="0"/>
-              <a:t>AR_Drone_2_thread.xml</a:t>
-            </a:r>
-            <a:endParaRPr lang="nl-NL" dirty="0"/>
-          </a:p>
-          <a:p>
-            <a:pPr lvl="1"/>
-            <a:r>
-              <a:rPr lang="nl-NL" dirty="0"/>
-              <a:t>Appears to the user as</a:t>
-            </a:r>
-            <a:r>
-              <a:rPr lang="nl-NL" dirty="0" smtClean="0"/>
-              <a:t>:</a:t>
-            </a:r>
-          </a:p>
-          <a:p>
-            <a:pPr lvl="2"/>
-            <a:r>
-              <a:rPr lang="nl-NL" dirty="0"/>
-              <a:t>Configuration parameters &gt; Hardware Implementation &gt; </a:t>
-            </a:r>
-            <a:r>
-              <a:rPr lang="nl-NL" dirty="0" smtClean="0"/>
-              <a:t>Target Hardware Resources</a:t>
-            </a:r>
-            <a:endParaRPr lang="nl-NL" dirty="0"/>
+              <a:t>parameters &gt; Code Generation &gt; Toolchain</a:t>
+            </a:r>
           </a:p>
           <a:p>
             <a:pPr lvl="1"/>
@@ -10716,14 +11587,43 @@
             <a:pPr lvl="2"/>
             <a:r>
               <a:rPr lang="nl-NL" dirty="0" smtClean="0"/>
-              <a:t>Settings fot the Drone IP Adress and clock speed</a:t>
+              <a:t>User description for the Hardware Board UI and Toolchain name</a:t>
             </a:r>
           </a:p>
           <a:p>
             <a:pPr lvl="2"/>
             <a:r>
               <a:rPr lang="nl-NL" dirty="0" smtClean="0"/>
-              <a:t>Selection of “Build” versus “Build, load and run” as default Simulink “Build” behaviour</a:t>
+              <a:t>Commands passed to the ssh_download.bat script </a:t>
+            </a:r>
+          </a:p>
+          <a:p>
+            <a:pPr lvl="2"/>
+            <a:r>
+              <a:rPr lang="nl-NL" dirty="0" smtClean="0"/>
+              <a:t>Location of the MATLAB linux codertarget XML file</a:t>
+            </a:r>
+          </a:p>
+          <a:p>
+            <a:pPr lvl="1"/>
+            <a:r>
+              <a:rPr lang="nl-NL" dirty="0" smtClean="0"/>
+              <a:t>Custom file pointers:</a:t>
+            </a:r>
+            <a:endParaRPr lang="nl-NL" u="sng" dirty="0" smtClean="0"/>
+          </a:p>
+          <a:p>
+            <a:pPr lvl="2"/>
+            <a:r>
+              <a:rPr lang="nl-NL" dirty="0" smtClean="0"/>
+              <a:t>arm_cortex_a8_ParameterInfo.xml</a:t>
+            </a:r>
+          </a:p>
+          <a:p>
+            <a:pPr lvl="2"/>
+            <a:r>
+              <a:rPr lang="nl-NL" dirty="0" smtClean="0"/>
+              <a:t>arm_cortex_a8_AttributeInfo.xml</a:t>
             </a:r>
             <a:endParaRPr lang="nl-NL" dirty="0"/>
           </a:p>
@@ -10732,7 +11632,7 @@
     </p:spTree>
     <p:extLst>
       <p:ext uri="{BB962C8B-B14F-4D97-AF65-F5344CB8AC3E}">
-        <p14:creationId xmlns:p14="http://schemas.microsoft.com/office/powerpoint/2010/main" val="679587418"/>
+        <p14:creationId xmlns:p14="http://schemas.microsoft.com/office/powerpoint/2010/main" val="3092856080"/>
       </p:ext>
     </p:extLst>
   </p:cSld>
@@ -10775,12 +11675,8 @@
           <a:lstStyle/>
           <a:p>
             <a:r>
-              <a:rPr lang="nl-NL" dirty="0" smtClean="0"/>
-              <a:t>arm_cortex_a8_AttributeInfo.xml</a:t>
-            </a:r>
-            <a:r>
               <a:rPr lang="nl-NL" dirty="0"/>
-              <a:t/>
+              <a:t>arm_cortex_a8_ParameterInfo.xml</a:t>
             </a:r>
             <a:br>
               <a:rPr lang="nl-NL" dirty="0"/>
@@ -10818,14 +11714,7 @@
             <a:pPr lvl="2"/>
             <a:r>
               <a:rPr lang="nl-NL" dirty="0" smtClean="0"/>
-              <a:t>Set the AR Drone specific code generation flags</a:t>
-            </a:r>
-          </a:p>
-          <a:p>
-            <a:pPr lvl="2"/>
-            <a:r>
-              <a:rPr lang="nl-NL" dirty="0" smtClean="0"/>
-              <a:t>Enbale the Drone to communicate via External Mode with Simulink</a:t>
+              <a:t>Provide custom UI options to the user in the configuration parameters</a:t>
             </a:r>
           </a:p>
           <a:p>
@@ -10850,6 +11739,29 @@
           <a:p>
             <a:pPr lvl="1"/>
             <a:r>
+              <a:rPr lang="nl-NL" dirty="0"/>
+              <a:t>Appears to the user as</a:t>
+            </a:r>
+            <a:r>
+              <a:rPr lang="nl-NL" dirty="0" smtClean="0"/>
+              <a:t>:</a:t>
+            </a:r>
+          </a:p>
+          <a:p>
+            <a:pPr lvl="2"/>
+            <a:r>
+              <a:rPr lang="nl-NL" dirty="0"/>
+              <a:t>Configuration parameters &gt; Hardware Implementation &gt; </a:t>
+            </a:r>
+            <a:r>
+              <a:rPr lang="nl-NL" dirty="0" smtClean="0"/>
+              <a:t>Target Hardware Resources</a:t>
+            </a:r>
+            <a:endParaRPr lang="nl-NL" dirty="0"/>
+          </a:p>
+          <a:p>
+            <a:pPr lvl="1"/>
+            <a:r>
               <a:rPr lang="nl-NL" dirty="0" smtClean="0"/>
               <a:t>Contains:</a:t>
             </a:r>
@@ -10858,22 +11770,23 @@
             <a:pPr lvl="2"/>
             <a:r>
               <a:rPr lang="nl-NL" dirty="0" smtClean="0"/>
-              <a:t>ARM specific compiler, assembler and linker flags</a:t>
+              <a:t>Settings fot the Drone IP Adress and clock speed</a:t>
             </a:r>
           </a:p>
           <a:p>
             <a:pPr lvl="2"/>
             <a:r>
               <a:rPr lang="nl-NL" dirty="0" smtClean="0"/>
-              <a:t>Location of the External Mode rtiostream files (tcpip)</a:t>
-            </a:r>
+              <a:t>Selection of “Build” versus “Build, load and run” as default Simulink “Build” behaviour</a:t>
+            </a:r>
+            <a:endParaRPr lang="nl-NL" dirty="0"/>
           </a:p>
         </p:txBody>
       </p:sp>
     </p:spTree>
     <p:extLst>
       <p:ext uri="{BB962C8B-B14F-4D97-AF65-F5344CB8AC3E}">
-        <p14:creationId xmlns:p14="http://schemas.microsoft.com/office/powerpoint/2010/main" val="2297659202"/>
+        <p14:creationId xmlns:p14="http://schemas.microsoft.com/office/powerpoint/2010/main" val="679587418"/>
       </p:ext>
     </p:extLst>
   </p:cSld>

</xml_diff>